<commit_message>
add two presentations for tomorrow
</commit_message>
<xml_diff>
--- a/presentations/2-Variable_Density_Flow.pptx
+++ b/presentations/2-Variable_Density_Flow.pptx
@@ -5,13 +5,15 @@
     <p:sldMasterId id="2147483648" r:id="rId1"/>
   </p:sldMasterIdLst>
   <p:notesMasterIdLst>
-    <p:notesMasterId r:id="rId6"/>
+    <p:notesMasterId r:id="rId8"/>
   </p:notesMasterIdLst>
   <p:sldIdLst>
     <p:sldId id="256" r:id="rId2"/>
-    <p:sldId id="1366" r:id="rId3"/>
-    <p:sldId id="1369" r:id="rId4"/>
-    <p:sldId id="1373" r:id="rId5"/>
+    <p:sldId id="1436" r:id="rId3"/>
+    <p:sldId id="1366" r:id="rId4"/>
+    <p:sldId id="1438" r:id="rId5"/>
+    <p:sldId id="1513" r:id="rId6"/>
+    <p:sldId id="1369" r:id="rId7"/>
   </p:sldIdLst>
   <p:sldSz cx="12192000" cy="6858000"/>
   <p:notesSz cx="6858000" cy="9144000"/>
@@ -200,7 +202,7 @@
           <a:p>
             <a:fld id="{C0C5AD05-AA96-9E45-ACD0-85B9A9AECD2E}" type="datetimeFigureOut">
               <a:rPr lang="en-US" smtClean="0"/>
-              <a:t>11/18/2024</a:t>
+              <a:t>11/21/2024</a:t>
             </a:fld>
             <a:endParaRPr lang="en-US"/>
           </a:p>
@@ -467,6 +469,90 @@
 </p:notesMaster>
 </file>
 
+<file path=ppt/notesSlides/notesSlide1.xml><?xml version="1.0" encoding="utf-8"?>
+<p:notes xmlns:a="http://schemas.openxmlformats.org/drawingml/2006/main" xmlns:r="http://schemas.openxmlformats.org/officeDocument/2006/relationships" xmlns:p="http://schemas.openxmlformats.org/presentationml/2006/main">
+  <p:cSld>
+    <p:spTree>
+      <p:nvGrpSpPr>
+        <p:cNvPr id="1" name=""/>
+        <p:cNvGrpSpPr/>
+        <p:nvPr/>
+      </p:nvGrpSpPr>
+      <p:grpSpPr>
+        <a:xfrm>
+          <a:off x="0" y="0"/>
+          <a:ext cx="0" cy="0"/>
+          <a:chOff x="0" y="0"/>
+          <a:chExt cx="0" cy="0"/>
+        </a:xfrm>
+      </p:grpSpPr>
+      <p:sp>
+        <p:nvSpPr>
+          <p:cNvPr id="2" name="Slide Image Placeholder 1"/>
+          <p:cNvSpPr>
+            <a:spLocks noGrp="1" noRot="1" noChangeAspect="1"/>
+          </p:cNvSpPr>
+          <p:nvPr>
+            <p:ph type="sldImg"/>
+          </p:nvPr>
+        </p:nvSpPr>
+        <p:spPr/>
+      </p:sp>
+      <p:sp>
+        <p:nvSpPr>
+          <p:cNvPr id="3" name="Notes Placeholder 2"/>
+          <p:cNvSpPr>
+            <a:spLocks noGrp="1"/>
+          </p:cNvSpPr>
+          <p:nvPr>
+            <p:ph type="body" idx="1"/>
+          </p:nvPr>
+        </p:nvSpPr>
+        <p:spPr/>
+        <p:txBody>
+          <a:bodyPr/>
+          <a:lstStyle/>
+          <a:p>
+            <a:endParaRPr lang="en-US" dirty="0"/>
+          </a:p>
+        </p:txBody>
+      </p:sp>
+      <p:sp>
+        <p:nvSpPr>
+          <p:cNvPr id="4" name="Slide Number Placeholder 3"/>
+          <p:cNvSpPr>
+            <a:spLocks noGrp="1"/>
+          </p:cNvSpPr>
+          <p:nvPr>
+            <p:ph type="sldNum" sz="quarter" idx="5"/>
+          </p:nvPr>
+        </p:nvSpPr>
+        <p:spPr/>
+        <p:txBody>
+          <a:bodyPr/>
+          <a:lstStyle/>
+          <a:p>
+            <a:fld id="{C2E4511F-89AD-4F41-8904-318FB6FBD11F}" type="slidenum">
+              <a:rPr lang="en-US" smtClean="0"/>
+              <a:t>5</a:t>
+            </a:fld>
+            <a:endParaRPr lang="en-US"/>
+          </a:p>
+        </p:txBody>
+      </p:sp>
+    </p:spTree>
+    <p:extLst>
+      <p:ext uri="{BB962C8B-B14F-4D97-AF65-F5344CB8AC3E}">
+        <p14:creationId xmlns:p14="http://schemas.microsoft.com/office/powerpoint/2010/main" val="3916314458"/>
+      </p:ext>
+    </p:extLst>
+  </p:cSld>
+  <p:clrMapOvr>
+    <a:masterClrMapping/>
+  </p:clrMapOvr>
+</p:notes>
+</file>
+
 <file path=ppt/slideLayouts/slideLayout1.xml><?xml version="1.0" encoding="utf-8"?>
 <p:sldLayout xmlns:a="http://schemas.openxmlformats.org/drawingml/2006/main" xmlns:r="http://schemas.openxmlformats.org/officeDocument/2006/relationships" xmlns:p="http://schemas.openxmlformats.org/presentationml/2006/main" type="title" preserve="1">
   <p:cSld name="Title Slide">
@@ -614,7 +700,7 @@
           <a:p>
             <a:fld id="{2BE7F1A7-46C0-614C-8973-2677197B1A3C}" type="datetimeFigureOut">
               <a:rPr lang="en-US" smtClean="0"/>
-              <a:t>11/18/2024</a:t>
+              <a:t>11/21/2024</a:t>
             </a:fld>
             <a:endParaRPr lang="en-US"/>
           </a:p>
@@ -812,7 +898,7 @@
           <a:p>
             <a:fld id="{2BE7F1A7-46C0-614C-8973-2677197B1A3C}" type="datetimeFigureOut">
               <a:rPr lang="en-US" smtClean="0"/>
-              <a:t>11/18/2024</a:t>
+              <a:t>11/21/2024</a:t>
             </a:fld>
             <a:endParaRPr lang="en-US"/>
           </a:p>
@@ -1020,7 +1106,7 @@
           <a:p>
             <a:fld id="{2BE7F1A7-46C0-614C-8973-2677197B1A3C}" type="datetimeFigureOut">
               <a:rPr lang="en-US" smtClean="0"/>
-              <a:t>11/18/2024</a:t>
+              <a:t>11/21/2024</a:t>
             </a:fld>
             <a:endParaRPr lang="en-US"/>
           </a:p>
@@ -1218,7 +1304,7 @@
           <a:p>
             <a:fld id="{2BE7F1A7-46C0-614C-8973-2677197B1A3C}" type="datetimeFigureOut">
               <a:rPr lang="en-US" smtClean="0"/>
-              <a:t>11/18/2024</a:t>
+              <a:t>11/21/2024</a:t>
             </a:fld>
             <a:endParaRPr lang="en-US"/>
           </a:p>
@@ -1493,7 +1579,7 @@
           <a:p>
             <a:fld id="{2BE7F1A7-46C0-614C-8973-2677197B1A3C}" type="datetimeFigureOut">
               <a:rPr lang="en-US" smtClean="0"/>
-              <a:t>11/18/2024</a:t>
+              <a:t>11/21/2024</a:t>
             </a:fld>
             <a:endParaRPr lang="en-US"/>
           </a:p>
@@ -1758,7 +1844,7 @@
           <a:p>
             <a:fld id="{2BE7F1A7-46C0-614C-8973-2677197B1A3C}" type="datetimeFigureOut">
               <a:rPr lang="en-US" smtClean="0"/>
-              <a:t>11/18/2024</a:t>
+              <a:t>11/21/2024</a:t>
             </a:fld>
             <a:endParaRPr lang="en-US"/>
           </a:p>
@@ -2170,7 +2256,7 @@
           <a:p>
             <a:fld id="{2BE7F1A7-46C0-614C-8973-2677197B1A3C}" type="datetimeFigureOut">
               <a:rPr lang="en-US" smtClean="0"/>
-              <a:t>11/18/2024</a:t>
+              <a:t>11/21/2024</a:t>
             </a:fld>
             <a:endParaRPr lang="en-US"/>
           </a:p>
@@ -2311,7 +2397,7 @@
           <a:p>
             <a:fld id="{2BE7F1A7-46C0-614C-8973-2677197B1A3C}" type="datetimeFigureOut">
               <a:rPr lang="en-US" smtClean="0"/>
-              <a:t>11/18/2024</a:t>
+              <a:t>11/21/2024</a:t>
             </a:fld>
             <a:endParaRPr lang="en-US"/>
           </a:p>
@@ -2424,7 +2510,7 @@
           <a:p>
             <a:fld id="{2BE7F1A7-46C0-614C-8973-2677197B1A3C}" type="datetimeFigureOut">
               <a:rPr lang="en-US" smtClean="0"/>
-              <a:t>11/18/2024</a:t>
+              <a:t>11/21/2024</a:t>
             </a:fld>
             <a:endParaRPr lang="en-US"/>
           </a:p>
@@ -2735,7 +2821,7 @@
           <a:p>
             <a:fld id="{2BE7F1A7-46C0-614C-8973-2677197B1A3C}" type="datetimeFigureOut">
               <a:rPr lang="en-US" smtClean="0"/>
-              <a:t>11/18/2024</a:t>
+              <a:t>11/21/2024</a:t>
             </a:fld>
             <a:endParaRPr lang="en-US"/>
           </a:p>
@@ -3023,7 +3109,7 @@
           <a:p>
             <a:fld id="{2BE7F1A7-46C0-614C-8973-2677197B1A3C}" type="datetimeFigureOut">
               <a:rPr lang="en-US" smtClean="0"/>
-              <a:t>11/18/2024</a:t>
+              <a:t>11/21/2024</a:t>
             </a:fld>
             <a:endParaRPr lang="en-US"/>
           </a:p>
@@ -3264,7 +3350,7 @@
           <a:p>
             <a:fld id="{2BE7F1A7-46C0-614C-8973-2677197B1A3C}" type="datetimeFigureOut">
               <a:rPr lang="en-US" smtClean="0"/>
-              <a:t>11/18/2024</a:t>
+              <a:t>11/21/2024</a:t>
             </a:fld>
             <a:endParaRPr lang="en-US"/>
           </a:p>
@@ -4322,7 +4408,7 @@
           <a:noFill/>
           <a:extLst>
             <a:ext uri="{909E8E84-426E-40dd-AFC4-6F175D3DCCD1}">
-              <a14:hiddenFill xmlns:a14="http://schemas.microsoft.com/office/drawing/2010/main" xmlns="">
+              <a14:hiddenFill xmlns="" xmlns:a14="http://schemas.microsoft.com/office/drawing/2010/main">
                 <a:solidFill>
                   <a:srgbClr val="FFFFFF"/>
                 </a:solidFill>
@@ -4709,41 +4795,10 @@
       </p:grpSpPr>
       <p:sp>
         <p:nvSpPr>
-          <p:cNvPr id="3" name="Content Placeholder 2">
-            <a:extLst>
-              <a:ext uri="{FF2B5EF4-FFF2-40B4-BE49-F238E27FC236}">
-                <a16:creationId xmlns:a16="http://schemas.microsoft.com/office/drawing/2014/main" id="{BF515B95-CAF6-5CEE-74B6-4AD5C56A39A0}"/>
-              </a:ext>
-            </a:extLst>
-          </p:cNvPr>
-          <p:cNvSpPr>
-            <a:spLocks noGrp="1"/>
-          </p:cNvSpPr>
-          <p:nvPr>
-            <p:ph idx="1"/>
-          </p:nvPr>
-        </p:nvSpPr>
-        <p:spPr/>
-        <p:txBody>
-          <a:bodyPr>
-            <a:normAutofit/>
-          </a:bodyPr>
-          <a:lstStyle/>
-          <a:p>
-            <a:r>
-              <a:rPr lang="en-US"/>
-              <a:t>points</a:t>
-            </a:r>
-            <a:endParaRPr lang="en-US" dirty="0"/>
-          </a:p>
-        </p:txBody>
-      </p:sp>
-      <p:sp>
-        <p:nvSpPr>
-          <p:cNvPr id="5" name="Title 4">
-            <a:extLst>
-              <a:ext uri="{FF2B5EF4-FFF2-40B4-BE49-F238E27FC236}">
-                <a16:creationId xmlns:a16="http://schemas.microsoft.com/office/drawing/2014/main" id="{C4C64AFA-1207-A282-D9BA-77418E5922A3}"/>
+          <p:cNvPr id="4" name="Title 3">
+            <a:extLst>
+              <a:ext uri="{FF2B5EF4-FFF2-40B4-BE49-F238E27FC236}">
+                <a16:creationId xmlns:a16="http://schemas.microsoft.com/office/drawing/2014/main" id="{D04374EA-E23F-56B9-4B53-57A4AC6FB585}"/>
               </a:ext>
             </a:extLst>
           </p:cNvPr>
@@ -4760,8 +4815,662 @@
           <a:lstStyle/>
           <a:p>
             <a:r>
-              <a:rPr lang="nl-NL"/>
-              <a:t>Title</a:t>
+              <a:rPr lang="en-US" dirty="0"/>
+              <a:t>Approaches for Representing Variable-Density Flow</a:t>
+            </a:r>
+          </a:p>
+        </p:txBody>
+      </p:sp>
+      <p:pic>
+        <p:nvPicPr>
+          <p:cNvPr id="6" name="Picture 4">
+            <a:extLst>
+              <a:ext uri="{FF2B5EF4-FFF2-40B4-BE49-F238E27FC236}">
+                <a16:creationId xmlns:a16="http://schemas.microsoft.com/office/drawing/2014/main" id="{AFF2A6EA-D711-BB70-4405-38B8FEED33F9}"/>
+              </a:ext>
+            </a:extLst>
+          </p:cNvPr>
+          <p:cNvPicPr>
+            <a:picLocks noChangeAspect="1" noChangeArrowheads="1"/>
+          </p:cNvPicPr>
+          <p:nvPr/>
+        </p:nvPicPr>
+        <p:blipFill>
+          <a:blip r:embed="rId2">
+            <a:extLst>
+              <a:ext uri="{28A0092B-C50C-407E-A947-70E740481C1C}">
+                <a14:useLocalDpi xmlns:a14="http://schemas.microsoft.com/office/drawing/2010/main" val="0"/>
+              </a:ext>
+            </a:extLst>
+          </a:blip>
+          <a:srcRect/>
+          <a:stretch>
+            <a:fillRect/>
+          </a:stretch>
+        </p:blipFill>
+        <p:spPr bwMode="auto">
+          <a:xfrm>
+            <a:off x="2598420" y="1718310"/>
+            <a:ext cx="4513263" cy="1328738"/>
+          </a:xfrm>
+          <a:prstGeom prst="rect">
+            <a:avLst/>
+          </a:prstGeom>
+          <a:noFill/>
+          <a:ln>
+            <a:noFill/>
+          </a:ln>
+          <a:extLst>
+            <a:ext uri="{909E8E84-426E-40DD-AFC4-6F175D3DCCD1}">
+              <a14:hiddenFill xmlns:a14="http://schemas.microsoft.com/office/drawing/2010/main">
+                <a:solidFill>
+                  <a:srgbClr val="FFFFFF"/>
+                </a:solidFill>
+              </a14:hiddenFill>
+            </a:ext>
+            <a:ext uri="{91240B29-F687-4F45-9708-019B960494DF}">
+              <a14:hiddenLine xmlns:a14="http://schemas.microsoft.com/office/drawing/2010/main" w="9525">
+                <a:solidFill>
+                  <a:srgbClr val="000000"/>
+                </a:solidFill>
+                <a:miter lim="800000"/>
+                <a:headEnd/>
+                <a:tailEnd/>
+              </a14:hiddenLine>
+            </a:ext>
+          </a:extLst>
+        </p:spPr>
+      </p:pic>
+      <p:pic>
+        <p:nvPicPr>
+          <p:cNvPr id="7" name="Picture 5">
+            <a:extLst>
+              <a:ext uri="{FF2B5EF4-FFF2-40B4-BE49-F238E27FC236}">
+                <a16:creationId xmlns:a16="http://schemas.microsoft.com/office/drawing/2014/main" id="{DA4037A0-8D1C-8FFC-8C10-F2A13564B018}"/>
+              </a:ext>
+            </a:extLst>
+          </p:cNvPr>
+          <p:cNvPicPr>
+            <a:picLocks noChangeAspect="1" noChangeArrowheads="1"/>
+          </p:cNvPicPr>
+          <p:nvPr/>
+        </p:nvPicPr>
+        <p:blipFill>
+          <a:blip r:embed="rId3">
+            <a:extLst>
+              <a:ext uri="{28A0092B-C50C-407E-A947-70E740481C1C}">
+                <a14:useLocalDpi xmlns:a14="http://schemas.microsoft.com/office/drawing/2010/main" val="0"/>
+              </a:ext>
+            </a:extLst>
+          </a:blip>
+          <a:srcRect/>
+          <a:stretch>
+            <a:fillRect/>
+          </a:stretch>
+        </p:blipFill>
+        <p:spPr bwMode="auto">
+          <a:xfrm>
+            <a:off x="2598420" y="3318510"/>
+            <a:ext cx="4495800" cy="1322388"/>
+          </a:xfrm>
+          <a:prstGeom prst="rect">
+            <a:avLst/>
+          </a:prstGeom>
+          <a:noFill/>
+          <a:ln>
+            <a:noFill/>
+          </a:ln>
+          <a:extLst>
+            <a:ext uri="{909E8E84-426E-40DD-AFC4-6F175D3DCCD1}">
+              <a14:hiddenFill xmlns:a14="http://schemas.microsoft.com/office/drawing/2010/main">
+                <a:solidFill>
+                  <a:srgbClr val="FFFFFF"/>
+                </a:solidFill>
+              </a14:hiddenFill>
+            </a:ext>
+            <a:ext uri="{91240B29-F687-4F45-9708-019B960494DF}">
+              <a14:hiddenLine xmlns:a14="http://schemas.microsoft.com/office/drawing/2010/main" w="9525">
+                <a:solidFill>
+                  <a:srgbClr val="000000"/>
+                </a:solidFill>
+                <a:miter lim="800000"/>
+                <a:headEnd/>
+                <a:tailEnd/>
+              </a14:hiddenLine>
+            </a:ext>
+          </a:extLst>
+        </p:spPr>
+      </p:pic>
+      <p:pic>
+        <p:nvPicPr>
+          <p:cNvPr id="8" name="Picture 6">
+            <a:extLst>
+              <a:ext uri="{FF2B5EF4-FFF2-40B4-BE49-F238E27FC236}">
+                <a16:creationId xmlns:a16="http://schemas.microsoft.com/office/drawing/2014/main" id="{8B802C2E-492E-195E-5799-B7511C1F876A}"/>
+              </a:ext>
+            </a:extLst>
+          </p:cNvPr>
+          <p:cNvPicPr>
+            <a:picLocks noChangeAspect="1" noChangeArrowheads="1"/>
+          </p:cNvPicPr>
+          <p:nvPr/>
+        </p:nvPicPr>
+        <p:blipFill>
+          <a:blip r:embed="rId4">
+            <a:extLst>
+              <a:ext uri="{28A0092B-C50C-407E-A947-70E740481C1C}">
+                <a14:useLocalDpi xmlns:a14="http://schemas.microsoft.com/office/drawing/2010/main" val="0"/>
+              </a:ext>
+            </a:extLst>
+          </a:blip>
+          <a:srcRect/>
+          <a:stretch>
+            <a:fillRect/>
+          </a:stretch>
+        </p:blipFill>
+        <p:spPr bwMode="auto">
+          <a:xfrm>
+            <a:off x="2598420" y="4918710"/>
+            <a:ext cx="4495800" cy="1322388"/>
+          </a:xfrm>
+          <a:prstGeom prst="rect">
+            <a:avLst/>
+          </a:prstGeom>
+          <a:noFill/>
+          <a:ln>
+            <a:noFill/>
+          </a:ln>
+          <a:extLst>
+            <a:ext uri="{909E8E84-426E-40DD-AFC4-6F175D3DCCD1}">
+              <a14:hiddenFill xmlns:a14="http://schemas.microsoft.com/office/drawing/2010/main">
+                <a:solidFill>
+                  <a:srgbClr val="FFFFFF"/>
+                </a:solidFill>
+              </a14:hiddenFill>
+            </a:ext>
+            <a:ext uri="{91240B29-F687-4F45-9708-019B960494DF}">
+              <a14:hiddenLine xmlns:a14="http://schemas.microsoft.com/office/drawing/2010/main" w="9525">
+                <a:solidFill>
+                  <a:srgbClr val="000000"/>
+                </a:solidFill>
+                <a:miter lim="800000"/>
+                <a:headEnd/>
+                <a:tailEnd/>
+              </a14:hiddenLine>
+            </a:ext>
+          </a:extLst>
+        </p:spPr>
+      </p:pic>
+      <p:sp>
+        <p:nvSpPr>
+          <p:cNvPr id="9" name="Text Box 7">
+            <a:extLst>
+              <a:ext uri="{FF2B5EF4-FFF2-40B4-BE49-F238E27FC236}">
+                <a16:creationId xmlns:a16="http://schemas.microsoft.com/office/drawing/2014/main" id="{17C6B980-20CF-D49B-D6C1-5C7D05574010}"/>
+              </a:ext>
+            </a:extLst>
+          </p:cNvPr>
+          <p:cNvSpPr txBox="1">
+            <a:spLocks noChangeArrowheads="1"/>
+          </p:cNvSpPr>
+          <p:nvPr/>
+        </p:nvSpPr>
+        <p:spPr bwMode="auto">
+          <a:xfrm>
+            <a:off x="7611745" y="2288223"/>
+            <a:ext cx="1073150" cy="366712"/>
+          </a:xfrm>
+          <a:prstGeom prst="rect">
+            <a:avLst/>
+          </a:prstGeom>
+          <a:noFill/>
+          <a:ln>
+            <a:noFill/>
+          </a:ln>
+          <a:extLst>
+            <a:ext uri="{909E8E84-426E-40DD-AFC4-6F175D3DCCD1}">
+              <a14:hiddenFill xmlns:a14="http://schemas.microsoft.com/office/drawing/2010/main">
+                <a:solidFill>
+                  <a:srgbClr val="FFFFFF"/>
+                </a:solidFill>
+              </a14:hiddenFill>
+            </a:ext>
+            <a:ext uri="{91240B29-F687-4F45-9708-019B960494DF}">
+              <a14:hiddenLine xmlns:a14="http://schemas.microsoft.com/office/drawing/2010/main" w="9525">
+                <a:solidFill>
+                  <a:srgbClr val="000000"/>
+                </a:solidFill>
+                <a:miter lim="800000"/>
+                <a:headEnd/>
+                <a:tailEnd/>
+              </a14:hiddenLine>
+            </a:ext>
+          </a:extLst>
+        </p:spPr>
+        <p:txBody>
+          <a:bodyPr wrap="none">
+            <a:spAutoFit/>
+          </a:bodyPr>
+          <a:lstStyle>
+            <a:lvl1pPr eaLnBrk="0" hangingPunct="0">
+              <a:defRPr sz="2400">
+                <a:solidFill>
+                  <a:schemeClr val="tx1"/>
+                </a:solidFill>
+                <a:latin typeface="Times New Roman" panose="02020603050405020304" pitchFamily="18" charset="0"/>
+              </a:defRPr>
+            </a:lvl1pPr>
+            <a:lvl2pPr marL="742950" indent="-285750" eaLnBrk="0" hangingPunct="0">
+              <a:defRPr sz="2400">
+                <a:solidFill>
+                  <a:schemeClr val="tx1"/>
+                </a:solidFill>
+                <a:latin typeface="Times New Roman" panose="02020603050405020304" pitchFamily="18" charset="0"/>
+              </a:defRPr>
+            </a:lvl2pPr>
+            <a:lvl3pPr marL="1143000" indent="-228600" eaLnBrk="0" hangingPunct="0">
+              <a:defRPr sz="2400">
+                <a:solidFill>
+                  <a:schemeClr val="tx1"/>
+                </a:solidFill>
+                <a:latin typeface="Times New Roman" panose="02020603050405020304" pitchFamily="18" charset="0"/>
+              </a:defRPr>
+            </a:lvl3pPr>
+            <a:lvl4pPr marL="1600200" indent="-228600" eaLnBrk="0" hangingPunct="0">
+              <a:defRPr sz="2400">
+                <a:solidFill>
+                  <a:schemeClr val="tx1"/>
+                </a:solidFill>
+                <a:latin typeface="Times New Roman" panose="02020603050405020304" pitchFamily="18" charset="0"/>
+              </a:defRPr>
+            </a:lvl4pPr>
+            <a:lvl5pPr marL="2057400" indent="-228600" eaLnBrk="0" hangingPunct="0">
+              <a:defRPr sz="2400">
+                <a:solidFill>
+                  <a:schemeClr val="tx1"/>
+                </a:solidFill>
+                <a:latin typeface="Times New Roman" panose="02020603050405020304" pitchFamily="18" charset="0"/>
+              </a:defRPr>
+            </a:lvl5pPr>
+            <a:lvl6pPr marL="2514600" indent="-228600" eaLnBrk="0" fontAlgn="base" hangingPunct="0">
+              <a:spcBef>
+                <a:spcPct val="0"/>
+              </a:spcBef>
+              <a:spcAft>
+                <a:spcPct val="0"/>
+              </a:spcAft>
+              <a:defRPr sz="2400">
+                <a:solidFill>
+                  <a:schemeClr val="tx1"/>
+                </a:solidFill>
+                <a:latin typeface="Times New Roman" panose="02020603050405020304" pitchFamily="18" charset="0"/>
+              </a:defRPr>
+            </a:lvl6pPr>
+            <a:lvl7pPr marL="2971800" indent="-228600" eaLnBrk="0" fontAlgn="base" hangingPunct="0">
+              <a:spcBef>
+                <a:spcPct val="0"/>
+              </a:spcBef>
+              <a:spcAft>
+                <a:spcPct val="0"/>
+              </a:spcAft>
+              <a:defRPr sz="2400">
+                <a:solidFill>
+                  <a:schemeClr val="tx1"/>
+                </a:solidFill>
+                <a:latin typeface="Times New Roman" panose="02020603050405020304" pitchFamily="18" charset="0"/>
+              </a:defRPr>
+            </a:lvl7pPr>
+            <a:lvl8pPr marL="3429000" indent="-228600" eaLnBrk="0" fontAlgn="base" hangingPunct="0">
+              <a:spcBef>
+                <a:spcPct val="0"/>
+              </a:spcBef>
+              <a:spcAft>
+                <a:spcPct val="0"/>
+              </a:spcAft>
+              <a:defRPr sz="2400">
+                <a:solidFill>
+                  <a:schemeClr val="tx1"/>
+                </a:solidFill>
+                <a:latin typeface="Times New Roman" panose="02020603050405020304" pitchFamily="18" charset="0"/>
+              </a:defRPr>
+            </a:lvl8pPr>
+            <a:lvl9pPr marL="3886200" indent="-228600" eaLnBrk="0" fontAlgn="base" hangingPunct="0">
+              <a:spcBef>
+                <a:spcPct val="0"/>
+              </a:spcBef>
+              <a:spcAft>
+                <a:spcPct val="0"/>
+              </a:spcAft>
+              <a:defRPr sz="2400">
+                <a:solidFill>
+                  <a:schemeClr val="tx1"/>
+                </a:solidFill>
+                <a:latin typeface="Times New Roman" panose="02020603050405020304" pitchFamily="18" charset="0"/>
+              </a:defRPr>
+            </a:lvl9pPr>
+          </a:lstStyle>
+          <a:p>
+            <a:r>
+              <a:rPr lang="en-US" altLang="en-US" sz="1800">
+                <a:latin typeface="Arial" panose="020B0604020202020204" pitchFamily="34" charset="0"/>
+              </a:rPr>
+              <a:t>Ignore it!</a:t>
+            </a:r>
+          </a:p>
+        </p:txBody>
+      </p:sp>
+      <p:sp>
+        <p:nvSpPr>
+          <p:cNvPr id="10" name="Text Box 8">
+            <a:extLst>
+              <a:ext uri="{FF2B5EF4-FFF2-40B4-BE49-F238E27FC236}">
+                <a16:creationId xmlns:a16="http://schemas.microsoft.com/office/drawing/2014/main" id="{B985C6DB-2501-BA70-5C3A-7E050FF97B80}"/>
+              </a:ext>
+            </a:extLst>
+          </p:cNvPr>
+          <p:cNvSpPr txBox="1">
+            <a:spLocks noChangeArrowheads="1"/>
+          </p:cNvSpPr>
+          <p:nvPr/>
+        </p:nvSpPr>
+        <p:spPr bwMode="auto">
+          <a:xfrm>
+            <a:off x="7535545" y="3964623"/>
+            <a:ext cx="2749550" cy="366712"/>
+          </a:xfrm>
+          <a:prstGeom prst="rect">
+            <a:avLst/>
+          </a:prstGeom>
+          <a:noFill/>
+          <a:ln>
+            <a:noFill/>
+          </a:ln>
+          <a:extLst>
+            <a:ext uri="{909E8E84-426E-40DD-AFC4-6F175D3DCCD1}">
+              <a14:hiddenFill xmlns:a14="http://schemas.microsoft.com/office/drawing/2010/main">
+                <a:solidFill>
+                  <a:srgbClr val="FFFFFF"/>
+                </a:solidFill>
+              </a14:hiddenFill>
+            </a:ext>
+            <a:ext uri="{91240B29-F687-4F45-9708-019B960494DF}">
+              <a14:hiddenLine xmlns:a14="http://schemas.microsoft.com/office/drawing/2010/main" w="9525">
+                <a:solidFill>
+                  <a:srgbClr val="000000"/>
+                </a:solidFill>
+                <a:miter lim="800000"/>
+                <a:headEnd/>
+                <a:tailEnd/>
+              </a14:hiddenLine>
+            </a:ext>
+          </a:extLst>
+        </p:spPr>
+        <p:txBody>
+          <a:bodyPr wrap="none">
+            <a:spAutoFit/>
+          </a:bodyPr>
+          <a:lstStyle>
+            <a:lvl1pPr eaLnBrk="0" hangingPunct="0">
+              <a:defRPr sz="2400">
+                <a:solidFill>
+                  <a:schemeClr val="tx1"/>
+                </a:solidFill>
+                <a:latin typeface="Times New Roman" panose="02020603050405020304" pitchFamily="18" charset="0"/>
+              </a:defRPr>
+            </a:lvl1pPr>
+            <a:lvl2pPr marL="742950" indent="-285750" eaLnBrk="0" hangingPunct="0">
+              <a:defRPr sz="2400">
+                <a:solidFill>
+                  <a:schemeClr val="tx1"/>
+                </a:solidFill>
+                <a:latin typeface="Times New Roman" panose="02020603050405020304" pitchFamily="18" charset="0"/>
+              </a:defRPr>
+            </a:lvl2pPr>
+            <a:lvl3pPr marL="1143000" indent="-228600" eaLnBrk="0" hangingPunct="0">
+              <a:defRPr sz="2400">
+                <a:solidFill>
+                  <a:schemeClr val="tx1"/>
+                </a:solidFill>
+                <a:latin typeface="Times New Roman" panose="02020603050405020304" pitchFamily="18" charset="0"/>
+              </a:defRPr>
+            </a:lvl3pPr>
+            <a:lvl4pPr marL="1600200" indent="-228600" eaLnBrk="0" hangingPunct="0">
+              <a:defRPr sz="2400">
+                <a:solidFill>
+                  <a:schemeClr val="tx1"/>
+                </a:solidFill>
+                <a:latin typeface="Times New Roman" panose="02020603050405020304" pitchFamily="18" charset="0"/>
+              </a:defRPr>
+            </a:lvl4pPr>
+            <a:lvl5pPr marL="2057400" indent="-228600" eaLnBrk="0" hangingPunct="0">
+              <a:defRPr sz="2400">
+                <a:solidFill>
+                  <a:schemeClr val="tx1"/>
+                </a:solidFill>
+                <a:latin typeface="Times New Roman" panose="02020603050405020304" pitchFamily="18" charset="0"/>
+              </a:defRPr>
+            </a:lvl5pPr>
+            <a:lvl6pPr marL="2514600" indent="-228600" eaLnBrk="0" fontAlgn="base" hangingPunct="0">
+              <a:spcBef>
+                <a:spcPct val="0"/>
+              </a:spcBef>
+              <a:spcAft>
+                <a:spcPct val="0"/>
+              </a:spcAft>
+              <a:defRPr sz="2400">
+                <a:solidFill>
+                  <a:schemeClr val="tx1"/>
+                </a:solidFill>
+                <a:latin typeface="Times New Roman" panose="02020603050405020304" pitchFamily="18" charset="0"/>
+              </a:defRPr>
+            </a:lvl6pPr>
+            <a:lvl7pPr marL="2971800" indent="-228600" eaLnBrk="0" fontAlgn="base" hangingPunct="0">
+              <a:spcBef>
+                <a:spcPct val="0"/>
+              </a:spcBef>
+              <a:spcAft>
+                <a:spcPct val="0"/>
+              </a:spcAft>
+              <a:defRPr sz="2400">
+                <a:solidFill>
+                  <a:schemeClr val="tx1"/>
+                </a:solidFill>
+                <a:latin typeface="Times New Roman" panose="02020603050405020304" pitchFamily="18" charset="0"/>
+              </a:defRPr>
+            </a:lvl7pPr>
+            <a:lvl8pPr marL="3429000" indent="-228600" eaLnBrk="0" fontAlgn="base" hangingPunct="0">
+              <a:spcBef>
+                <a:spcPct val="0"/>
+              </a:spcBef>
+              <a:spcAft>
+                <a:spcPct val="0"/>
+              </a:spcAft>
+              <a:defRPr sz="2400">
+                <a:solidFill>
+                  <a:schemeClr val="tx1"/>
+                </a:solidFill>
+                <a:latin typeface="Times New Roman" panose="02020603050405020304" pitchFamily="18" charset="0"/>
+              </a:defRPr>
+            </a:lvl8pPr>
+            <a:lvl9pPr marL="3886200" indent="-228600" eaLnBrk="0" fontAlgn="base" hangingPunct="0">
+              <a:spcBef>
+                <a:spcPct val="0"/>
+              </a:spcBef>
+              <a:spcAft>
+                <a:spcPct val="0"/>
+              </a:spcAft>
+              <a:defRPr sz="2400">
+                <a:solidFill>
+                  <a:schemeClr val="tx1"/>
+                </a:solidFill>
+                <a:latin typeface="Times New Roman" panose="02020603050405020304" pitchFamily="18" charset="0"/>
+              </a:defRPr>
+            </a:lvl9pPr>
+          </a:lstStyle>
+          <a:p>
+            <a:r>
+              <a:rPr lang="en-US" altLang="en-US" sz="1800" dirty="0">
+                <a:latin typeface="Arial" panose="020B0604020202020204" pitchFamily="34" charset="0"/>
+              </a:rPr>
+              <a:t>Sharp interface approach</a:t>
+            </a:r>
+          </a:p>
+        </p:txBody>
+      </p:sp>
+      <p:sp>
+        <p:nvSpPr>
+          <p:cNvPr id="11" name="Text Box 9">
+            <a:extLst>
+              <a:ext uri="{FF2B5EF4-FFF2-40B4-BE49-F238E27FC236}">
+                <a16:creationId xmlns:a16="http://schemas.microsoft.com/office/drawing/2014/main" id="{D36A8E6B-FF29-0D0F-F458-140A26CA5E3F}"/>
+              </a:ext>
+            </a:extLst>
+          </p:cNvPr>
+          <p:cNvSpPr txBox="1">
+            <a:spLocks noChangeArrowheads="1"/>
+          </p:cNvSpPr>
+          <p:nvPr/>
+        </p:nvSpPr>
+        <p:spPr bwMode="auto">
+          <a:xfrm>
+            <a:off x="7551420" y="5528310"/>
+            <a:ext cx="2743200" cy="915988"/>
+          </a:xfrm>
+          <a:prstGeom prst="rect">
+            <a:avLst/>
+          </a:prstGeom>
+          <a:noFill/>
+          <a:ln>
+            <a:noFill/>
+          </a:ln>
+          <a:extLst>
+            <a:ext uri="{909E8E84-426E-40DD-AFC4-6F175D3DCCD1}">
+              <a14:hiddenFill xmlns:a14="http://schemas.microsoft.com/office/drawing/2010/main">
+                <a:solidFill>
+                  <a:srgbClr val="FFFFFF"/>
+                </a:solidFill>
+              </a14:hiddenFill>
+            </a:ext>
+            <a:ext uri="{91240B29-F687-4F45-9708-019B960494DF}">
+              <a14:hiddenLine xmlns:a14="http://schemas.microsoft.com/office/drawing/2010/main" w="9525">
+                <a:solidFill>
+                  <a:srgbClr val="000000"/>
+                </a:solidFill>
+                <a:miter lim="800000"/>
+                <a:headEnd/>
+                <a:tailEnd/>
+              </a14:hiddenLine>
+            </a:ext>
+          </a:extLst>
+        </p:spPr>
+        <p:txBody>
+          <a:bodyPr>
+            <a:spAutoFit/>
+          </a:bodyPr>
+          <a:lstStyle>
+            <a:lvl1pPr eaLnBrk="0" hangingPunct="0">
+              <a:defRPr sz="2400">
+                <a:solidFill>
+                  <a:schemeClr val="tx1"/>
+                </a:solidFill>
+                <a:latin typeface="Times New Roman" panose="02020603050405020304" pitchFamily="18" charset="0"/>
+              </a:defRPr>
+            </a:lvl1pPr>
+            <a:lvl2pPr marL="742950" indent="-285750" eaLnBrk="0" hangingPunct="0">
+              <a:defRPr sz="2400">
+                <a:solidFill>
+                  <a:schemeClr val="tx1"/>
+                </a:solidFill>
+                <a:latin typeface="Times New Roman" panose="02020603050405020304" pitchFamily="18" charset="0"/>
+              </a:defRPr>
+            </a:lvl2pPr>
+            <a:lvl3pPr marL="1143000" indent="-228600" eaLnBrk="0" hangingPunct="0">
+              <a:defRPr sz="2400">
+                <a:solidFill>
+                  <a:schemeClr val="tx1"/>
+                </a:solidFill>
+                <a:latin typeface="Times New Roman" panose="02020603050405020304" pitchFamily="18" charset="0"/>
+              </a:defRPr>
+            </a:lvl3pPr>
+            <a:lvl4pPr marL="1600200" indent="-228600" eaLnBrk="0" hangingPunct="0">
+              <a:defRPr sz="2400">
+                <a:solidFill>
+                  <a:schemeClr val="tx1"/>
+                </a:solidFill>
+                <a:latin typeface="Times New Roman" panose="02020603050405020304" pitchFamily="18" charset="0"/>
+              </a:defRPr>
+            </a:lvl4pPr>
+            <a:lvl5pPr marL="2057400" indent="-228600" eaLnBrk="0" hangingPunct="0">
+              <a:defRPr sz="2400">
+                <a:solidFill>
+                  <a:schemeClr val="tx1"/>
+                </a:solidFill>
+                <a:latin typeface="Times New Roman" panose="02020603050405020304" pitchFamily="18" charset="0"/>
+              </a:defRPr>
+            </a:lvl5pPr>
+            <a:lvl6pPr marL="2514600" indent="-228600" eaLnBrk="0" fontAlgn="base" hangingPunct="0">
+              <a:spcBef>
+                <a:spcPct val="0"/>
+              </a:spcBef>
+              <a:spcAft>
+                <a:spcPct val="0"/>
+              </a:spcAft>
+              <a:defRPr sz="2400">
+                <a:solidFill>
+                  <a:schemeClr val="tx1"/>
+                </a:solidFill>
+                <a:latin typeface="Times New Roman" panose="02020603050405020304" pitchFamily="18" charset="0"/>
+              </a:defRPr>
+            </a:lvl6pPr>
+            <a:lvl7pPr marL="2971800" indent="-228600" eaLnBrk="0" fontAlgn="base" hangingPunct="0">
+              <a:spcBef>
+                <a:spcPct val="0"/>
+              </a:spcBef>
+              <a:spcAft>
+                <a:spcPct val="0"/>
+              </a:spcAft>
+              <a:defRPr sz="2400">
+                <a:solidFill>
+                  <a:schemeClr val="tx1"/>
+                </a:solidFill>
+                <a:latin typeface="Times New Roman" panose="02020603050405020304" pitchFamily="18" charset="0"/>
+              </a:defRPr>
+            </a:lvl7pPr>
+            <a:lvl8pPr marL="3429000" indent="-228600" eaLnBrk="0" fontAlgn="base" hangingPunct="0">
+              <a:spcBef>
+                <a:spcPct val="0"/>
+              </a:spcBef>
+              <a:spcAft>
+                <a:spcPct val="0"/>
+              </a:spcAft>
+              <a:defRPr sz="2400">
+                <a:solidFill>
+                  <a:schemeClr val="tx1"/>
+                </a:solidFill>
+                <a:latin typeface="Times New Roman" panose="02020603050405020304" pitchFamily="18" charset="0"/>
+              </a:defRPr>
+            </a:lvl8pPr>
+            <a:lvl9pPr marL="3886200" indent="-228600" eaLnBrk="0" fontAlgn="base" hangingPunct="0">
+              <a:spcBef>
+                <a:spcPct val="0"/>
+              </a:spcBef>
+              <a:spcAft>
+                <a:spcPct val="0"/>
+              </a:spcAft>
+              <a:defRPr sz="2400">
+                <a:solidFill>
+                  <a:schemeClr val="tx1"/>
+                </a:solidFill>
+                <a:latin typeface="Times New Roman" panose="02020603050405020304" pitchFamily="18" charset="0"/>
+              </a:defRPr>
+            </a:lvl9pPr>
+          </a:lstStyle>
+          <a:p>
+            <a:r>
+              <a:rPr lang="en-US" altLang="en-US" sz="1800">
+                <a:latin typeface="Arial" panose="020B0604020202020204" pitchFamily="34" charset="0"/>
+              </a:rPr>
+              <a:t>Fully coupled flow and dispersive transport approach</a:t>
             </a:r>
           </a:p>
         </p:txBody>
@@ -4769,7 +5478,7 @@
     </p:spTree>
     <p:extLst>
       <p:ext uri="{BB962C8B-B14F-4D97-AF65-F5344CB8AC3E}">
-        <p14:creationId xmlns:p14="http://schemas.microsoft.com/office/powerpoint/2010/main" val="411999133"/>
+        <p14:creationId xmlns:p14="http://schemas.microsoft.com/office/powerpoint/2010/main" val="2380109513"/>
       </p:ext>
     </p:extLst>
   </p:cSld>
@@ -4796,12 +5505,145 @@
           <a:chExt cx="0" cy="0"/>
         </a:xfrm>
       </p:grpSpPr>
+      <p:sp>
+        <p:nvSpPr>
+          <p:cNvPr id="5" name="Title 4">
+            <a:extLst>
+              <a:ext uri="{FF2B5EF4-FFF2-40B4-BE49-F238E27FC236}">
+                <a16:creationId xmlns:a16="http://schemas.microsoft.com/office/drawing/2014/main" id="{C4C64AFA-1207-A282-D9BA-77418E5922A3}"/>
+              </a:ext>
+            </a:extLst>
+          </p:cNvPr>
+          <p:cNvSpPr>
+            <a:spLocks noGrp="1"/>
+          </p:cNvSpPr>
+          <p:nvPr>
+            <p:ph type="title"/>
+          </p:nvPr>
+        </p:nvSpPr>
+        <p:spPr/>
+        <p:txBody>
+          <a:bodyPr/>
+          <a:lstStyle/>
+          <a:p>
+            <a:r>
+              <a:rPr lang="nl-NL"/>
+              <a:t>Today: fresh water lense</a:t>
+            </a:r>
+          </a:p>
+        </p:txBody>
+      </p:sp>
+      <p:pic>
+        <p:nvPicPr>
+          <p:cNvPr id="1026" name="Picture 2" descr="Lens (hydrology) - Wikipedia">
+            <a:extLst>
+              <a:ext uri="{FF2B5EF4-FFF2-40B4-BE49-F238E27FC236}">
+                <a16:creationId xmlns:a16="http://schemas.microsoft.com/office/drawing/2014/main" id="{5BB15D3C-998D-71B0-7627-A5C597B45EEA}"/>
+              </a:ext>
+            </a:extLst>
+          </p:cNvPr>
+          <p:cNvPicPr>
+            <a:picLocks noChangeAspect="1" noChangeArrowheads="1"/>
+          </p:cNvPicPr>
+          <p:nvPr/>
+        </p:nvPicPr>
+        <p:blipFill>
+          <a:blip r:embed="rId2">
+            <a:extLst>
+              <a:ext uri="{28A0092B-C50C-407E-A947-70E740481C1C}">
+                <a14:useLocalDpi xmlns:a14="http://schemas.microsoft.com/office/drawing/2010/main" val="0"/>
+              </a:ext>
+            </a:extLst>
+          </a:blip>
+          <a:srcRect/>
+          <a:stretch>
+            <a:fillRect/>
+          </a:stretch>
+        </p:blipFill>
+        <p:spPr bwMode="auto">
+          <a:xfrm>
+            <a:off x="2823411" y="1329531"/>
+            <a:ext cx="6858000" cy="5343525"/>
+          </a:xfrm>
+          <a:prstGeom prst="rect">
+            <a:avLst/>
+          </a:prstGeom>
+          <a:noFill/>
+          <a:extLst>
+            <a:ext uri="{909E8E84-426E-40DD-AFC4-6F175D3DCCD1}">
+              <a14:hiddenFill xmlns:a14="http://schemas.microsoft.com/office/drawing/2010/main">
+                <a:solidFill>
+                  <a:srgbClr val="FFFFFF"/>
+                </a:solidFill>
+              </a14:hiddenFill>
+            </a:ext>
+          </a:extLst>
+        </p:spPr>
+      </p:pic>
+    </p:spTree>
+    <p:extLst>
+      <p:ext uri="{BB962C8B-B14F-4D97-AF65-F5344CB8AC3E}">
+        <p14:creationId xmlns:p14="http://schemas.microsoft.com/office/powerpoint/2010/main" val="411999133"/>
+      </p:ext>
+    </p:extLst>
+  </p:cSld>
+  <p:clrMapOvr>
+    <a:masterClrMapping/>
+  </p:clrMapOvr>
+</p:sld>
+</file>
+
+<file path=ppt/slides/slide4.xml><?xml version="1.0" encoding="utf-8"?>
+<p:sld xmlns:a="http://schemas.openxmlformats.org/drawingml/2006/main" xmlns:r="http://schemas.openxmlformats.org/officeDocument/2006/relationships" xmlns:p="http://schemas.openxmlformats.org/presentationml/2006/main">
+  <p:cSld>
+    <p:spTree>
+      <p:nvGrpSpPr>
+        <p:cNvPr id="1" name=""/>
+        <p:cNvGrpSpPr/>
+        <p:nvPr/>
+      </p:nvGrpSpPr>
+      <p:grpSpPr>
+        <a:xfrm>
+          <a:off x="0" y="0"/>
+          <a:ext cx="0" cy="0"/>
+          <a:chOff x="0" y="0"/>
+          <a:chExt cx="0" cy="0"/>
+        </a:xfrm>
+      </p:grpSpPr>
+      <p:sp>
+        <p:nvSpPr>
+          <p:cNvPr id="2" name="Title 1">
+            <a:extLst>
+              <a:ext uri="{FF2B5EF4-FFF2-40B4-BE49-F238E27FC236}">
+                <a16:creationId xmlns:a16="http://schemas.microsoft.com/office/drawing/2014/main" id="{A2072938-F973-143A-5EF0-E1EE077C5147}"/>
+              </a:ext>
+            </a:extLst>
+          </p:cNvPr>
+          <p:cNvSpPr>
+            <a:spLocks noGrp="1"/>
+          </p:cNvSpPr>
+          <p:nvPr>
+            <p:ph type="title"/>
+          </p:nvPr>
+        </p:nvSpPr>
+        <p:spPr/>
+        <p:txBody>
+          <a:bodyPr/>
+          <a:lstStyle/>
+          <a:p>
+            <a:r>
+              <a:rPr lang="en-US" dirty="0"/>
+              <a:t>Buoyancy (BUY) Package</a:t>
+            </a:r>
+          </a:p>
+        </p:txBody>
+      </p:sp>
       <p:grpSp>
         <p:nvGrpSpPr>
-          <p:cNvPr id="132" name="Group 131">
-            <a:extLst>
-              <a:ext uri="{FF2B5EF4-FFF2-40B4-BE49-F238E27FC236}">
-                <a16:creationId xmlns:a16="http://schemas.microsoft.com/office/drawing/2014/main" id="{7CC5954F-6D52-5730-AA80-BB2AFB06B954}"/>
+          <p:cNvPr id="11" name="Group 10">
+            <a:extLst>
+              <a:ext uri="{FF2B5EF4-FFF2-40B4-BE49-F238E27FC236}">
+                <a16:creationId xmlns:a16="http://schemas.microsoft.com/office/drawing/2014/main" id="{208B038A-B871-3B0E-3D05-1BEF033C5DA5}"/>
               </a:ext>
             </a:extLst>
           </p:cNvPr>
@@ -4810,1307 +5652,886 @@
         </p:nvGrpSpPr>
         <p:grpSpPr>
           <a:xfrm>
-            <a:off x="7434699" y="1457242"/>
-            <a:ext cx="4208350" cy="5088104"/>
-            <a:chOff x="7125466" y="365125"/>
-            <a:chExt cx="4208350" cy="5088104"/>
+            <a:off x="1486426" y="1900118"/>
+            <a:ext cx="3328283" cy="849698"/>
+            <a:chOff x="1406416" y="1792250"/>
+            <a:chExt cx="3328283" cy="849698"/>
           </a:xfrm>
         </p:grpSpPr>
-        <p:cxnSp>
-          <p:nvCxnSpPr>
-            <p:cNvPr id="20" name="Connector: Elbow 77">
+        <p:pic>
+          <p:nvPicPr>
+            <p:cNvPr id="6" name="Picture 5">
               <a:extLst>
                 <a:ext uri="{FF2B5EF4-FFF2-40B4-BE49-F238E27FC236}">
-                  <a16:creationId xmlns:a16="http://schemas.microsoft.com/office/drawing/2014/main" id="{CA210C25-763B-3C7B-96F9-A5638ECB9E67}"/>
+                  <a16:creationId xmlns:a16="http://schemas.microsoft.com/office/drawing/2014/main" id="{259B40FB-E685-87F4-91EA-AFDF09FC4B27}"/>
                 </a:ext>
               </a:extLst>
             </p:cNvPr>
-            <p:cNvCxnSpPr>
-              <a:cxnSpLocks/>
-              <a:endCxn id="54" idx="3"/>
-            </p:cNvCxnSpPr>
+            <p:cNvPicPr>
+              <a:picLocks noChangeAspect="1"/>
+            </p:cNvPicPr>
             <p:nvPr/>
-          </p:nvCxnSpPr>
+          </p:nvPicPr>
+          <p:blipFill>
+            <a:blip r:embed="rId2"/>
+            <a:stretch>
+              <a:fillRect/>
+            </a:stretch>
+          </p:blipFill>
           <p:spPr>
-            <a:xfrm rot="5400000" flipH="1" flipV="1">
-              <a:off x="9275519" y="3992768"/>
-              <a:ext cx="1501680" cy="873651"/>
+            <a:xfrm>
+              <a:off x="2162502" y="2194906"/>
+              <a:ext cx="1351896" cy="447042"/>
             </a:xfrm>
-            <a:prstGeom prst="bentConnector4">
-              <a:avLst>
-                <a:gd name="adj1" fmla="val -1833"/>
-                <a:gd name="adj2" fmla="val 138982"/>
-              </a:avLst>
+            <a:prstGeom prst="rect">
+              <a:avLst/>
             </a:prstGeom>
-            <a:ln w="31750">
-              <a:solidFill>
-                <a:srgbClr val="FF85FF"/>
-              </a:solidFill>
-            </a:ln>
           </p:spPr>
-          <p:style>
-            <a:lnRef idx="1">
-              <a:schemeClr val="accent1"/>
-            </a:lnRef>
-            <a:fillRef idx="0">
-              <a:schemeClr val="accent1"/>
-            </a:fillRef>
-            <a:effectRef idx="0">
-              <a:schemeClr val="accent1"/>
-            </a:effectRef>
-            <a:fontRef idx="minor">
-              <a:schemeClr val="tx1"/>
-            </a:fontRef>
-          </p:style>
-        </p:cxnSp>
-        <p:cxnSp>
-          <p:nvCxnSpPr>
-            <p:cNvPr id="22" name="Elbow Connector 21">
+        </p:pic>
+        <p:sp>
+          <p:nvSpPr>
+            <p:cNvPr id="7" name="TextBox 6">
               <a:extLst>
                 <a:ext uri="{FF2B5EF4-FFF2-40B4-BE49-F238E27FC236}">
-                  <a16:creationId xmlns:a16="http://schemas.microsoft.com/office/drawing/2014/main" id="{CD33E5D4-F43B-138E-21F1-4FE1C4A44A95}"/>
+                  <a16:creationId xmlns:a16="http://schemas.microsoft.com/office/drawing/2014/main" id="{0B032E8D-25DB-FF4E-7028-63290B98A02E}"/>
                 </a:ext>
               </a:extLst>
             </p:cNvPr>
-            <p:cNvCxnSpPr>
-              <a:cxnSpLocks/>
-              <a:endCxn id="52" idx="3"/>
-            </p:cNvCxnSpPr>
-            <p:nvPr/>
-          </p:nvCxnSpPr>
-          <p:spPr>
-            <a:xfrm rot="5400000" flipH="1" flipV="1">
-              <a:off x="9198729" y="3519920"/>
-              <a:ext cx="1661110" cy="867802"/>
-            </a:xfrm>
-            <a:prstGeom prst="bentConnector4">
-              <a:avLst>
-                <a:gd name="adj1" fmla="val 4265"/>
-                <a:gd name="adj2" fmla="val 127417"/>
-              </a:avLst>
-            </a:prstGeom>
-            <a:ln w="31750">
-              <a:solidFill>
-                <a:srgbClr val="FF85FF"/>
-              </a:solidFill>
-              <a:tailEnd type="none"/>
-            </a:ln>
-          </p:spPr>
-          <p:style>
-            <a:lnRef idx="2">
-              <a:schemeClr val="accent1"/>
-            </a:lnRef>
-            <a:fillRef idx="0">
-              <a:schemeClr val="accent1"/>
-            </a:fillRef>
-            <a:effectRef idx="1">
-              <a:schemeClr val="accent1"/>
-            </a:effectRef>
-            <a:fontRef idx="minor">
-              <a:schemeClr val="tx1"/>
-            </a:fontRef>
-          </p:style>
-        </p:cxnSp>
-        <p:sp>
-          <p:nvSpPr>
-            <p:cNvPr id="28" name="Rounded Rectangle 27">
-              <a:extLst>
-                <a:ext uri="{FF2B5EF4-FFF2-40B4-BE49-F238E27FC236}">
-                  <a16:creationId xmlns:a16="http://schemas.microsoft.com/office/drawing/2014/main" id="{27BE7C0E-F950-5813-C0BA-B92D0D1D5AA2}"/>
-                </a:ext>
-              </a:extLst>
-            </p:cNvPr>
-            <p:cNvSpPr/>
+            <p:cNvSpPr txBox="1"/>
             <p:nvPr/>
           </p:nvSpPr>
           <p:spPr>
             <a:xfrm>
-              <a:off x="7125466" y="365125"/>
-              <a:ext cx="1316639" cy="351600"/>
+              <a:off x="1406416" y="1792250"/>
+              <a:ext cx="3328283" cy="369332"/>
             </a:xfrm>
-            <a:prstGeom prst="roundRect">
+            <a:prstGeom prst="rect">
               <a:avLst/>
             </a:prstGeom>
-            <a:solidFill>
-              <a:schemeClr val="accent1">
-                <a:lumMod val="20000"/>
-                <a:lumOff val="80000"/>
-              </a:schemeClr>
-            </a:solidFill>
+            <a:noFill/>
           </p:spPr>
-          <p:style>
-            <a:lnRef idx="2">
-              <a:schemeClr val="dk1"/>
-            </a:lnRef>
-            <a:fillRef idx="1">
-              <a:schemeClr val="lt1"/>
-            </a:fillRef>
-            <a:effectRef idx="0">
-              <a:schemeClr val="dk1"/>
-            </a:effectRef>
-            <a:fontRef idx="minor">
-              <a:schemeClr val="dk1"/>
-            </a:fontRef>
-          </p:style>
           <p:txBody>
-            <a:bodyPr rtlCol="0" anchor="ctr"/>
+            <a:bodyPr wrap="none" rtlCol="0">
+              <a:spAutoFit/>
+            </a:bodyPr>
             <a:lstStyle/>
             <a:p>
-              <a:pPr algn="ctr" defTabSz="457182"/>
               <a:r>
-                <a:rPr lang="en-US" sz="1000" b="1" dirty="0">
-                  <a:solidFill>
-                    <a:prstClr val="black"/>
-                  </a:solidFill>
-                  <a:latin typeface="Arial"/>
-                  <a:cs typeface="Arial"/>
-                </a:rPr>
-                <a:t>Simulation</a:t>
+                <a:rPr lang="en-US" b="1" dirty="0"/>
+                <a:t>Constant Density Flux Expression</a:t>
+              </a:r>
+            </a:p>
+          </p:txBody>
+        </p:sp>
+      </p:grpSp>
+      <p:grpSp>
+        <p:nvGrpSpPr>
+          <p:cNvPr id="12" name="Group 11">
+            <a:extLst>
+              <a:ext uri="{FF2B5EF4-FFF2-40B4-BE49-F238E27FC236}">
+                <a16:creationId xmlns:a16="http://schemas.microsoft.com/office/drawing/2014/main" id="{C7A08E97-3864-0DF3-6FE1-F90F4E56E27C}"/>
+              </a:ext>
+            </a:extLst>
+          </p:cNvPr>
+          <p:cNvGrpSpPr/>
+          <p:nvPr/>
+        </p:nvGrpSpPr>
+        <p:grpSpPr>
+          <a:xfrm>
+            <a:off x="5786096" y="1795888"/>
+            <a:ext cx="4826049" cy="1152677"/>
+            <a:chOff x="5786096" y="1795888"/>
+            <a:chExt cx="4826049" cy="1152677"/>
+          </a:xfrm>
+        </p:grpSpPr>
+        <p:pic>
+          <p:nvPicPr>
+            <p:cNvPr id="8" name="Picture 7">
+              <a:extLst>
+                <a:ext uri="{FF2B5EF4-FFF2-40B4-BE49-F238E27FC236}">
+                  <a16:creationId xmlns:a16="http://schemas.microsoft.com/office/drawing/2014/main" id="{C50A6D99-688B-3E87-2FE8-90625D2492AC}"/>
+                </a:ext>
+              </a:extLst>
+            </p:cNvPr>
+            <p:cNvPicPr>
+              <a:picLocks noChangeAspect="1"/>
+            </p:cNvPicPr>
+            <p:nvPr/>
+          </p:nvPicPr>
+          <p:blipFill>
+            <a:blip r:embed="rId3"/>
+            <a:stretch>
+              <a:fillRect/>
+            </a:stretch>
+          </p:blipFill>
+          <p:spPr>
+            <a:xfrm>
+              <a:off x="5786096" y="2187089"/>
+              <a:ext cx="4826049" cy="761476"/>
+            </a:xfrm>
+            <a:prstGeom prst="rect">
+              <a:avLst/>
+            </a:prstGeom>
+          </p:spPr>
+        </p:pic>
+        <p:sp>
+          <p:nvSpPr>
+            <p:cNvPr id="9" name="TextBox 8">
+              <a:extLst>
+                <a:ext uri="{FF2B5EF4-FFF2-40B4-BE49-F238E27FC236}">
+                  <a16:creationId xmlns:a16="http://schemas.microsoft.com/office/drawing/2014/main" id="{4FC4D580-27BB-2D38-B7DD-DA61399715F1}"/>
+                </a:ext>
+              </a:extLst>
+            </p:cNvPr>
+            <p:cNvSpPr txBox="1"/>
+            <p:nvPr/>
+          </p:nvSpPr>
+          <p:spPr>
+            <a:xfrm>
+              <a:off x="6591487" y="1795888"/>
+              <a:ext cx="3261534" cy="369332"/>
+            </a:xfrm>
+            <a:prstGeom prst="rect">
+              <a:avLst/>
+            </a:prstGeom>
+            <a:noFill/>
+          </p:spPr>
+          <p:txBody>
+            <a:bodyPr wrap="none" rtlCol="0">
+              <a:spAutoFit/>
+            </a:bodyPr>
+            <a:lstStyle/>
+            <a:p>
+              <a:r>
+                <a:rPr lang="en-US" b="1" dirty="0"/>
+                <a:t>Variable Density Flux Expression</a:t>
+              </a:r>
+            </a:p>
+          </p:txBody>
+        </p:sp>
+      </p:grpSp>
+      <p:grpSp>
+        <p:nvGrpSpPr>
+          <p:cNvPr id="13" name="Group 12">
+            <a:extLst>
+              <a:ext uri="{FF2B5EF4-FFF2-40B4-BE49-F238E27FC236}">
+                <a16:creationId xmlns:a16="http://schemas.microsoft.com/office/drawing/2014/main" id="{142722DD-FAAD-18F7-D2DB-DC6533AC24D4}"/>
+              </a:ext>
+            </a:extLst>
+          </p:cNvPr>
+          <p:cNvGrpSpPr/>
+          <p:nvPr/>
+        </p:nvGrpSpPr>
+        <p:grpSpPr>
+          <a:xfrm>
+            <a:off x="2162502" y="3490686"/>
+            <a:ext cx="7772400" cy="2314916"/>
+            <a:chOff x="2162502" y="3490686"/>
+            <a:chExt cx="7772400" cy="2314916"/>
+          </a:xfrm>
+        </p:grpSpPr>
+        <p:pic>
+          <p:nvPicPr>
+            <p:cNvPr id="4" name="Picture 3">
+              <a:extLst>
+                <a:ext uri="{FF2B5EF4-FFF2-40B4-BE49-F238E27FC236}">
+                  <a16:creationId xmlns:a16="http://schemas.microsoft.com/office/drawing/2014/main" id="{0303B46D-6A91-CE57-7063-5284C4348CEB}"/>
+                </a:ext>
+              </a:extLst>
+            </p:cNvPr>
+            <p:cNvPicPr>
+              <a:picLocks noChangeAspect="1"/>
+            </p:cNvPicPr>
+            <p:nvPr/>
+          </p:nvPicPr>
+          <p:blipFill>
+            <a:blip r:embed="rId4"/>
+            <a:stretch>
+              <a:fillRect/>
+            </a:stretch>
+          </p:blipFill>
+          <p:spPr>
+            <a:xfrm>
+              <a:off x="2162502" y="3709922"/>
+              <a:ext cx="7772400" cy="1044053"/>
+            </a:xfrm>
+            <a:prstGeom prst="rect">
+              <a:avLst/>
+            </a:prstGeom>
+          </p:spPr>
+        </p:pic>
+        <p:sp>
+          <p:nvSpPr>
+            <p:cNvPr id="5" name="TextBox 4">
+              <a:extLst>
+                <a:ext uri="{FF2B5EF4-FFF2-40B4-BE49-F238E27FC236}">
+                  <a16:creationId xmlns:a16="http://schemas.microsoft.com/office/drawing/2014/main" id="{4F92ED4A-30F7-A213-6A91-A7F5B806B2B5}"/>
+                </a:ext>
+              </a:extLst>
+            </p:cNvPr>
+            <p:cNvSpPr txBox="1"/>
+            <p:nvPr/>
+          </p:nvSpPr>
+          <p:spPr>
+            <a:xfrm>
+              <a:off x="4568286" y="3490686"/>
+              <a:ext cx="2603726" cy="369332"/>
+            </a:xfrm>
+            <a:prstGeom prst="rect">
+              <a:avLst/>
+            </a:prstGeom>
+            <a:noFill/>
+          </p:spPr>
+          <p:txBody>
+            <a:bodyPr wrap="none" rtlCol="0">
+              <a:spAutoFit/>
+            </a:bodyPr>
+            <a:lstStyle/>
+            <a:p>
+              <a:r>
+                <a:rPr lang="en-US" b="1" dirty="0"/>
+                <a:t>Density Equation of State</a:t>
               </a:r>
             </a:p>
           </p:txBody>
         </p:sp>
         <p:sp>
           <p:nvSpPr>
-            <p:cNvPr id="29" name="Rounded Rectangle 28">
+            <p:cNvPr id="10" name="TextBox 9">
               <a:extLst>
                 <a:ext uri="{FF2B5EF4-FFF2-40B4-BE49-F238E27FC236}">
-                  <a16:creationId xmlns:a16="http://schemas.microsoft.com/office/drawing/2014/main" id="{2D5816AE-905A-41FA-F100-6E713825985D}"/>
+                  <a16:creationId xmlns:a16="http://schemas.microsoft.com/office/drawing/2014/main" id="{AA67E655-6CC6-F6DB-626A-C26344EB05E7}"/>
                 </a:ext>
               </a:extLst>
             </p:cNvPr>
-            <p:cNvSpPr/>
+            <p:cNvSpPr txBox="1"/>
             <p:nvPr/>
           </p:nvSpPr>
           <p:spPr>
             <a:xfrm>
-              <a:off x="8057904" y="1348624"/>
-              <a:ext cx="1270640" cy="351600"/>
+              <a:off x="3711315" y="4882272"/>
+              <a:ext cx="4674774" cy="923330"/>
             </a:xfrm>
-            <a:prstGeom prst="roundRect">
+            <a:prstGeom prst="rect">
               <a:avLst/>
             </a:prstGeom>
-            <a:solidFill>
-              <a:schemeClr val="accent6">
-                <a:lumMod val="60000"/>
-                <a:lumOff val="40000"/>
-              </a:schemeClr>
-            </a:solidFill>
+            <a:noFill/>
           </p:spPr>
-          <p:style>
-            <a:lnRef idx="2">
-              <a:schemeClr val="dk1"/>
-            </a:lnRef>
-            <a:fillRef idx="1">
-              <a:schemeClr val="lt1"/>
-            </a:fillRef>
-            <a:effectRef idx="0">
-              <a:schemeClr val="dk1"/>
-            </a:effectRef>
-            <a:fontRef idx="minor">
-              <a:schemeClr val="dk1"/>
-            </a:fontRef>
-          </p:style>
           <p:txBody>
-            <a:bodyPr rtlCol="0" anchor="ctr"/>
+            <a:bodyPr wrap="square" rtlCol="0">
+              <a:spAutoFit/>
+            </a:bodyPr>
             <a:lstStyle/>
             <a:p>
-              <a:pPr algn="ctr" defTabSz="457182"/>
               <a:r>
-                <a:rPr lang="en-US" sz="1000" b="1" dirty="0">
-                  <a:solidFill>
-                    <a:prstClr val="black"/>
-                  </a:solidFill>
-                  <a:latin typeface="Arial"/>
-                  <a:cs typeface="Arial"/>
-                </a:rPr>
-                <a:t>Numerical  Solution 1</a:t>
+                <a:rPr lang="en-US" dirty="0"/>
+                <a:t>Density is calculated as a function of one or more concentrations in GWT models and temperature in a GWE model</a:t>
               </a:r>
             </a:p>
           </p:txBody>
         </p:sp>
-        <p:sp>
-          <p:nvSpPr>
-            <p:cNvPr id="30" name="Rounded Rectangle 29">
-              <a:extLst>
-                <a:ext uri="{FF2B5EF4-FFF2-40B4-BE49-F238E27FC236}">
-                  <a16:creationId xmlns:a16="http://schemas.microsoft.com/office/drawing/2014/main" id="{401D05C6-8FAA-8207-5C27-7329203519CA}"/>
-                </a:ext>
-              </a:extLst>
-            </p:cNvPr>
-            <p:cNvSpPr/>
-            <p:nvPr/>
-          </p:nvSpPr>
-          <p:spPr>
-            <a:xfrm>
-              <a:off x="8931556" y="1797965"/>
-              <a:ext cx="1537474" cy="351600"/>
-            </a:xfrm>
-            <a:prstGeom prst="roundRect">
-              <a:avLst/>
-            </a:prstGeom>
-            <a:solidFill>
-              <a:schemeClr val="accent4">
-                <a:lumMod val="60000"/>
-                <a:lumOff val="40000"/>
-              </a:schemeClr>
-            </a:solidFill>
-          </p:spPr>
-          <p:style>
-            <a:lnRef idx="2">
-              <a:schemeClr val="dk1"/>
-            </a:lnRef>
-            <a:fillRef idx="1">
-              <a:schemeClr val="lt1"/>
-            </a:fillRef>
-            <a:effectRef idx="0">
-              <a:schemeClr val="dk1"/>
-            </a:effectRef>
-            <a:fontRef idx="minor">
-              <a:schemeClr val="dk1"/>
-            </a:fontRef>
-          </p:style>
-          <p:txBody>
-            <a:bodyPr rtlCol="0" anchor="ctr"/>
-            <a:lstStyle/>
-            <a:p>
-              <a:pPr algn="ctr" defTabSz="457182"/>
-              <a:r>
-                <a:rPr lang="en-US" sz="1000" b="1" dirty="0">
-                  <a:solidFill>
-                    <a:prstClr val="black"/>
-                  </a:solidFill>
-                  <a:latin typeface="Arial"/>
-                  <a:cs typeface="Arial"/>
-                </a:rPr>
-                <a:t>Groundwater Flow Model 1</a:t>
-              </a:r>
-            </a:p>
-          </p:txBody>
-        </p:sp>
-        <p:sp>
-          <p:nvSpPr>
-            <p:cNvPr id="31" name="Rounded Rectangle 30">
-              <a:extLst>
-                <a:ext uri="{FF2B5EF4-FFF2-40B4-BE49-F238E27FC236}">
-                  <a16:creationId xmlns:a16="http://schemas.microsoft.com/office/drawing/2014/main" id="{0F337D4C-E740-5014-13CC-3798CCFD4FF0}"/>
-                </a:ext>
-              </a:extLst>
-            </p:cNvPr>
-            <p:cNvSpPr/>
-            <p:nvPr/>
-          </p:nvSpPr>
-          <p:spPr>
-            <a:xfrm>
-              <a:off x="8052061" y="821226"/>
-              <a:ext cx="1270638" cy="351600"/>
-            </a:xfrm>
-            <a:prstGeom prst="roundRect">
-              <a:avLst/>
-            </a:prstGeom>
-            <a:solidFill>
-              <a:schemeClr val="accent1">
-                <a:lumMod val="60000"/>
-                <a:lumOff val="40000"/>
-              </a:schemeClr>
-            </a:solidFill>
-          </p:spPr>
-          <p:style>
-            <a:lnRef idx="2">
-              <a:schemeClr val="dk1"/>
-            </a:lnRef>
-            <a:fillRef idx="1">
-              <a:schemeClr val="lt1"/>
-            </a:fillRef>
-            <a:effectRef idx="0">
-              <a:schemeClr val="dk1"/>
-            </a:effectRef>
-            <a:fontRef idx="minor">
-              <a:schemeClr val="dk1"/>
-            </a:fontRef>
-          </p:style>
-          <p:txBody>
-            <a:bodyPr rtlCol="0" anchor="ctr"/>
-            <a:lstStyle/>
-            <a:p>
-              <a:pPr algn="ctr" defTabSz="457182"/>
-              <a:r>
-                <a:rPr lang="en-US" sz="1000" b="1" dirty="0">
-                  <a:solidFill>
-                    <a:prstClr val="black"/>
-                  </a:solidFill>
-                  <a:latin typeface="Arial"/>
-                  <a:cs typeface="Arial"/>
-                </a:rPr>
-                <a:t>Temporal Discretization</a:t>
-              </a:r>
-            </a:p>
-          </p:txBody>
-        </p:sp>
-        <p:cxnSp>
-          <p:nvCxnSpPr>
-            <p:cNvPr id="32" name="Elbow Connector 31">
-              <a:extLst>
-                <a:ext uri="{FF2B5EF4-FFF2-40B4-BE49-F238E27FC236}">
-                  <a16:creationId xmlns:a16="http://schemas.microsoft.com/office/drawing/2014/main" id="{22F0C938-A820-9672-3794-7594FD9A2AE5}"/>
-                </a:ext>
-              </a:extLst>
-            </p:cNvPr>
-            <p:cNvCxnSpPr>
-              <a:stCxn id="28" idx="2"/>
-              <a:endCxn id="29" idx="1"/>
-            </p:cNvCxnSpPr>
-            <p:nvPr/>
-          </p:nvCxnSpPr>
-          <p:spPr>
-            <a:xfrm rot="16200000" flipH="1">
-              <a:off x="7516998" y="983514"/>
-              <a:ext cx="807699" cy="274120"/>
-            </a:xfrm>
-            <a:prstGeom prst="bentConnector2">
-              <a:avLst/>
-            </a:prstGeom>
-            <a:ln w="31750">
-              <a:solidFill>
-                <a:schemeClr val="tx1"/>
-              </a:solidFill>
-              <a:tailEnd type="triangle"/>
-            </a:ln>
-          </p:spPr>
-          <p:style>
-            <a:lnRef idx="2">
-              <a:schemeClr val="accent1"/>
-            </a:lnRef>
-            <a:fillRef idx="0">
-              <a:schemeClr val="accent1"/>
-            </a:fillRef>
-            <a:effectRef idx="1">
-              <a:schemeClr val="accent1"/>
-            </a:effectRef>
-            <a:fontRef idx="minor">
-              <a:schemeClr val="tx1"/>
-            </a:fontRef>
-          </p:style>
-        </p:cxnSp>
-        <p:cxnSp>
-          <p:nvCxnSpPr>
-            <p:cNvPr id="45" name="Elbow Connector 44">
-              <a:extLst>
-                <a:ext uri="{FF2B5EF4-FFF2-40B4-BE49-F238E27FC236}">
-                  <a16:creationId xmlns:a16="http://schemas.microsoft.com/office/drawing/2014/main" id="{9B3F87F4-CE97-6549-A9C0-9CA3B1E73B09}"/>
-                </a:ext>
-              </a:extLst>
-            </p:cNvPr>
-            <p:cNvCxnSpPr>
-              <a:stCxn id="28" idx="2"/>
-              <a:endCxn id="31" idx="1"/>
-            </p:cNvCxnSpPr>
-            <p:nvPr/>
-          </p:nvCxnSpPr>
-          <p:spPr>
-            <a:xfrm rot="16200000" flipH="1">
-              <a:off x="7777775" y="722739"/>
-              <a:ext cx="280301" cy="268277"/>
-            </a:xfrm>
-            <a:prstGeom prst="bentConnector2">
-              <a:avLst/>
-            </a:prstGeom>
-            <a:ln w="31750">
-              <a:solidFill>
-                <a:schemeClr val="tx1"/>
-              </a:solidFill>
-              <a:tailEnd type="triangle"/>
-            </a:ln>
-          </p:spPr>
-          <p:style>
-            <a:lnRef idx="2">
-              <a:schemeClr val="accent1"/>
-            </a:lnRef>
-            <a:fillRef idx="0">
-              <a:schemeClr val="accent1"/>
-            </a:fillRef>
-            <a:effectRef idx="1">
-              <a:schemeClr val="accent1"/>
-            </a:effectRef>
-            <a:fontRef idx="minor">
-              <a:schemeClr val="tx1"/>
-            </a:fontRef>
-          </p:style>
-        </p:cxnSp>
-        <p:cxnSp>
-          <p:nvCxnSpPr>
-            <p:cNvPr id="46" name="Elbow Connector 45">
-              <a:extLst>
-                <a:ext uri="{FF2B5EF4-FFF2-40B4-BE49-F238E27FC236}">
-                  <a16:creationId xmlns:a16="http://schemas.microsoft.com/office/drawing/2014/main" id="{2734B689-9F19-6F6B-3636-6BD32C92F47F}"/>
-                </a:ext>
-              </a:extLst>
-            </p:cNvPr>
-            <p:cNvCxnSpPr>
-              <a:cxnSpLocks/>
-              <a:stCxn id="29" idx="2"/>
-              <a:endCxn id="30" idx="1"/>
-            </p:cNvCxnSpPr>
-            <p:nvPr/>
-          </p:nvCxnSpPr>
-          <p:spPr>
-            <a:xfrm rot="16200000" flipH="1">
-              <a:off x="8675622" y="1717831"/>
-              <a:ext cx="273541" cy="238331"/>
-            </a:xfrm>
-            <a:prstGeom prst="bentConnector2">
-              <a:avLst/>
-            </a:prstGeom>
-            <a:ln w="31750">
-              <a:solidFill>
-                <a:schemeClr val="tx1"/>
-              </a:solidFill>
-              <a:tailEnd type="triangle"/>
-            </a:ln>
-          </p:spPr>
-          <p:style>
-            <a:lnRef idx="2">
-              <a:schemeClr val="accent1"/>
-            </a:lnRef>
-            <a:fillRef idx="0">
-              <a:schemeClr val="accent1"/>
-            </a:fillRef>
-            <a:effectRef idx="1">
-              <a:schemeClr val="accent1"/>
-            </a:effectRef>
-            <a:fontRef idx="minor">
-              <a:schemeClr val="tx1"/>
-            </a:fontRef>
-          </p:style>
-        </p:cxnSp>
-        <p:sp>
-          <p:nvSpPr>
-            <p:cNvPr id="51" name="Rounded Rectangle 50">
-              <a:extLst>
-                <a:ext uri="{FF2B5EF4-FFF2-40B4-BE49-F238E27FC236}">
-                  <a16:creationId xmlns:a16="http://schemas.microsoft.com/office/drawing/2014/main" id="{E8B58104-2235-5D24-FE96-4414E69AFA5B}"/>
-                </a:ext>
-              </a:extLst>
-            </p:cNvPr>
-            <p:cNvSpPr/>
-            <p:nvPr/>
-          </p:nvSpPr>
-          <p:spPr>
-            <a:xfrm>
-              <a:off x="8052059" y="2498125"/>
-              <a:ext cx="1270640" cy="351600"/>
-            </a:xfrm>
-            <a:prstGeom prst="roundRect">
-              <a:avLst/>
-            </a:prstGeom>
-            <a:solidFill>
-              <a:schemeClr val="accent6">
-                <a:lumMod val="60000"/>
-                <a:lumOff val="40000"/>
-              </a:schemeClr>
-            </a:solidFill>
-          </p:spPr>
-          <p:style>
-            <a:lnRef idx="2">
-              <a:schemeClr val="dk1"/>
-            </a:lnRef>
-            <a:fillRef idx="1">
-              <a:schemeClr val="lt1"/>
-            </a:fillRef>
-            <a:effectRef idx="0">
-              <a:schemeClr val="dk1"/>
-            </a:effectRef>
-            <a:fontRef idx="minor">
-              <a:schemeClr val="dk1"/>
-            </a:fontRef>
-          </p:style>
-          <p:txBody>
-            <a:bodyPr rtlCol="0" anchor="ctr"/>
-            <a:lstStyle/>
-            <a:p>
-              <a:pPr algn="ctr" defTabSz="457182"/>
-              <a:r>
-                <a:rPr lang="en-US" sz="1000" b="1" dirty="0">
-                  <a:solidFill>
-                    <a:prstClr val="black"/>
-                  </a:solidFill>
-                  <a:latin typeface="Arial"/>
-                  <a:cs typeface="Arial"/>
-                </a:rPr>
-                <a:t>Numerical  Solution 2</a:t>
-              </a:r>
-            </a:p>
-          </p:txBody>
-        </p:sp>
-        <p:sp>
-          <p:nvSpPr>
-            <p:cNvPr id="52" name="Rounded Rectangle 51">
-              <a:extLst>
-                <a:ext uri="{FF2B5EF4-FFF2-40B4-BE49-F238E27FC236}">
-                  <a16:creationId xmlns:a16="http://schemas.microsoft.com/office/drawing/2014/main" id="{B89662E3-95FA-5F9C-77DE-570A2C98B24D}"/>
-                </a:ext>
-              </a:extLst>
-            </p:cNvPr>
-            <p:cNvSpPr/>
-            <p:nvPr/>
-          </p:nvSpPr>
-          <p:spPr>
-            <a:xfrm>
-              <a:off x="8925711" y="2947466"/>
-              <a:ext cx="1537474" cy="351600"/>
-            </a:xfrm>
-            <a:prstGeom prst="roundRect">
-              <a:avLst/>
-            </a:prstGeom>
-            <a:solidFill>
-              <a:schemeClr val="accent4">
-                <a:lumMod val="60000"/>
-                <a:lumOff val="40000"/>
-              </a:schemeClr>
-            </a:solidFill>
-          </p:spPr>
-          <p:style>
-            <a:lnRef idx="2">
-              <a:schemeClr val="dk1"/>
-            </a:lnRef>
-            <a:fillRef idx="1">
-              <a:schemeClr val="lt1"/>
-            </a:fillRef>
-            <a:effectRef idx="0">
-              <a:schemeClr val="dk1"/>
-            </a:effectRef>
-            <a:fontRef idx="minor">
-              <a:schemeClr val="dk1"/>
-            </a:fontRef>
-          </p:style>
-          <p:txBody>
-            <a:bodyPr rtlCol="0" anchor="ctr"/>
-            <a:lstStyle/>
-            <a:p>
-              <a:pPr algn="ctr" defTabSz="457182"/>
-              <a:r>
-                <a:rPr lang="en-US" sz="1000" b="1" dirty="0">
-                  <a:solidFill>
-                    <a:prstClr val="black"/>
-                  </a:solidFill>
-                  <a:latin typeface="Arial"/>
-                  <a:cs typeface="Arial"/>
-                </a:rPr>
-                <a:t>Groundwater Transport Model 1</a:t>
-              </a:r>
-            </a:p>
-          </p:txBody>
-        </p:sp>
-        <p:cxnSp>
-          <p:nvCxnSpPr>
-            <p:cNvPr id="53" name="Elbow Connector 52">
-              <a:extLst>
-                <a:ext uri="{FF2B5EF4-FFF2-40B4-BE49-F238E27FC236}">
-                  <a16:creationId xmlns:a16="http://schemas.microsoft.com/office/drawing/2014/main" id="{C6670C31-4505-6699-1592-ECEAAC69DFEB}"/>
-                </a:ext>
-              </a:extLst>
-            </p:cNvPr>
-            <p:cNvCxnSpPr>
-              <a:cxnSpLocks/>
-              <a:stCxn id="51" idx="2"/>
-              <a:endCxn id="52" idx="1"/>
-            </p:cNvCxnSpPr>
-            <p:nvPr/>
-          </p:nvCxnSpPr>
-          <p:spPr>
-            <a:xfrm rot="16200000" flipH="1">
-              <a:off x="8669777" y="2867332"/>
-              <a:ext cx="273541" cy="238331"/>
-            </a:xfrm>
-            <a:prstGeom prst="bentConnector2">
-              <a:avLst/>
-            </a:prstGeom>
-            <a:ln w="31750">
-              <a:solidFill>
-                <a:schemeClr val="tx1"/>
-              </a:solidFill>
-              <a:tailEnd type="triangle"/>
-            </a:ln>
-          </p:spPr>
-          <p:style>
-            <a:lnRef idx="2">
-              <a:schemeClr val="accent1"/>
-            </a:lnRef>
-            <a:fillRef idx="0">
-              <a:schemeClr val="accent1"/>
-            </a:fillRef>
-            <a:effectRef idx="1">
-              <a:schemeClr val="accent1"/>
-            </a:effectRef>
-            <a:fontRef idx="minor">
-              <a:schemeClr val="tx1"/>
-            </a:fontRef>
-          </p:style>
-        </p:cxnSp>
-        <p:sp>
-          <p:nvSpPr>
-            <p:cNvPr id="54" name="Rounded Rectangle 53">
-              <a:extLst>
-                <a:ext uri="{FF2B5EF4-FFF2-40B4-BE49-F238E27FC236}">
-                  <a16:creationId xmlns:a16="http://schemas.microsoft.com/office/drawing/2014/main" id="{83660E0F-0AA0-950B-6E46-3308961178C7}"/>
-                </a:ext>
-              </a:extLst>
-            </p:cNvPr>
-            <p:cNvSpPr/>
-            <p:nvPr/>
-          </p:nvSpPr>
-          <p:spPr>
-            <a:xfrm>
-              <a:off x="8925711" y="3502953"/>
-              <a:ext cx="1537474" cy="351600"/>
-            </a:xfrm>
-            <a:prstGeom prst="roundRect">
-              <a:avLst/>
-            </a:prstGeom>
-            <a:solidFill>
-              <a:schemeClr val="accent4">
-                <a:lumMod val="60000"/>
-                <a:lumOff val="40000"/>
-              </a:schemeClr>
-            </a:solidFill>
-          </p:spPr>
-          <p:style>
-            <a:lnRef idx="2">
-              <a:schemeClr val="dk1"/>
-            </a:lnRef>
-            <a:fillRef idx="1">
-              <a:schemeClr val="lt1"/>
-            </a:fillRef>
-            <a:effectRef idx="0">
-              <a:schemeClr val="dk1"/>
-            </a:effectRef>
-            <a:fontRef idx="minor">
-              <a:schemeClr val="dk1"/>
-            </a:fontRef>
-          </p:style>
-          <p:txBody>
-            <a:bodyPr rtlCol="0" anchor="ctr"/>
-            <a:lstStyle/>
-            <a:p>
-              <a:pPr algn="ctr" defTabSz="457182"/>
-              <a:r>
-                <a:rPr lang="en-US" sz="1000" b="1" dirty="0">
-                  <a:solidFill>
-                    <a:prstClr val="black"/>
-                  </a:solidFill>
-                  <a:latin typeface="Arial"/>
-                  <a:cs typeface="Arial"/>
-                </a:rPr>
-                <a:t>Groundwater Transport Model 2</a:t>
-              </a:r>
-            </a:p>
-          </p:txBody>
-        </p:sp>
-        <p:cxnSp>
-          <p:nvCxnSpPr>
-            <p:cNvPr id="55" name="Elbow Connector 54">
-              <a:extLst>
-                <a:ext uri="{FF2B5EF4-FFF2-40B4-BE49-F238E27FC236}">
-                  <a16:creationId xmlns:a16="http://schemas.microsoft.com/office/drawing/2014/main" id="{35E5D011-4134-6E82-ADE0-6343518A7956}"/>
-                </a:ext>
-              </a:extLst>
-            </p:cNvPr>
-            <p:cNvCxnSpPr>
-              <a:cxnSpLocks/>
-              <a:stCxn id="51" idx="2"/>
-              <a:endCxn id="54" idx="1"/>
-            </p:cNvCxnSpPr>
-            <p:nvPr/>
-          </p:nvCxnSpPr>
-          <p:spPr>
-            <a:xfrm rot="16200000" flipH="1">
-              <a:off x="8392030" y="3145076"/>
-              <a:ext cx="829028" cy="238331"/>
-            </a:xfrm>
-            <a:prstGeom prst="bentConnector2">
-              <a:avLst/>
-            </a:prstGeom>
-            <a:ln w="31750">
-              <a:solidFill>
-                <a:schemeClr val="tx1"/>
-              </a:solidFill>
-              <a:tailEnd type="triangle"/>
-            </a:ln>
-          </p:spPr>
-          <p:style>
-            <a:lnRef idx="2">
-              <a:schemeClr val="accent1"/>
-            </a:lnRef>
-            <a:fillRef idx="0">
-              <a:schemeClr val="accent1"/>
-            </a:fillRef>
-            <a:effectRef idx="1">
-              <a:schemeClr val="accent1"/>
-            </a:effectRef>
-            <a:fontRef idx="minor">
-              <a:schemeClr val="tx1"/>
-            </a:fontRef>
-          </p:style>
-        </p:cxnSp>
-        <p:cxnSp>
-          <p:nvCxnSpPr>
-            <p:cNvPr id="58" name="Elbow Connector 57">
-              <a:extLst>
-                <a:ext uri="{FF2B5EF4-FFF2-40B4-BE49-F238E27FC236}">
-                  <a16:creationId xmlns:a16="http://schemas.microsoft.com/office/drawing/2014/main" id="{3BFECF6D-5B56-4EBC-BA20-4176675A3858}"/>
-                </a:ext>
-              </a:extLst>
-            </p:cNvPr>
-            <p:cNvCxnSpPr>
-              <a:cxnSpLocks/>
-              <a:stCxn id="28" idx="2"/>
-              <a:endCxn id="51" idx="1"/>
-            </p:cNvCxnSpPr>
-            <p:nvPr/>
-          </p:nvCxnSpPr>
-          <p:spPr>
-            <a:xfrm rot="16200000" flipH="1">
-              <a:off x="6939322" y="1561188"/>
-              <a:ext cx="1957200" cy="268273"/>
-            </a:xfrm>
-            <a:prstGeom prst="bentConnector2">
-              <a:avLst/>
-            </a:prstGeom>
-            <a:ln w="31750">
-              <a:solidFill>
-                <a:schemeClr val="tx1"/>
-              </a:solidFill>
-              <a:tailEnd type="triangle"/>
-            </a:ln>
-          </p:spPr>
-          <p:style>
-            <a:lnRef idx="2">
-              <a:schemeClr val="accent1"/>
-            </a:lnRef>
-            <a:fillRef idx="0">
-              <a:schemeClr val="accent1"/>
-            </a:fillRef>
-            <a:effectRef idx="1">
-              <a:schemeClr val="accent1"/>
-            </a:effectRef>
-            <a:fontRef idx="minor">
-              <a:schemeClr val="tx1"/>
-            </a:fontRef>
-          </p:style>
-        </p:cxnSp>
-        <p:sp>
-          <p:nvSpPr>
-            <p:cNvPr id="59" name="Rounded Rectangle 58">
-              <a:extLst>
-                <a:ext uri="{FF2B5EF4-FFF2-40B4-BE49-F238E27FC236}">
-                  <a16:creationId xmlns:a16="http://schemas.microsoft.com/office/drawing/2014/main" id="{3813BDD0-E4A8-337C-2F8B-701F3EB522B1}"/>
-                </a:ext>
-              </a:extLst>
-            </p:cNvPr>
-            <p:cNvSpPr/>
-            <p:nvPr/>
-          </p:nvSpPr>
-          <p:spPr>
-            <a:xfrm>
-              <a:off x="8057906" y="4608576"/>
-              <a:ext cx="1537474" cy="351600"/>
-            </a:xfrm>
-            <a:prstGeom prst="roundRect">
-              <a:avLst/>
-            </a:prstGeom>
-            <a:solidFill>
-              <a:srgbClr val="FF85FF"/>
-            </a:solidFill>
-          </p:spPr>
-          <p:style>
-            <a:lnRef idx="2">
-              <a:schemeClr val="dk1"/>
-            </a:lnRef>
-            <a:fillRef idx="1">
-              <a:schemeClr val="lt1"/>
-            </a:fillRef>
-            <a:effectRef idx="0">
-              <a:schemeClr val="dk1"/>
-            </a:effectRef>
-            <a:fontRef idx="minor">
-              <a:schemeClr val="dk1"/>
-            </a:fontRef>
-          </p:style>
-          <p:txBody>
-            <a:bodyPr rtlCol="0" anchor="ctr"/>
-            <a:lstStyle/>
-            <a:p>
-              <a:pPr algn="ctr" defTabSz="457182"/>
-              <a:r>
-                <a:rPr lang="en-US" sz="1000" b="1" dirty="0">
-                  <a:solidFill>
-                    <a:prstClr val="black"/>
-                  </a:solidFill>
-                  <a:latin typeface="Arial"/>
-                  <a:cs typeface="Arial"/>
-                </a:rPr>
-                <a:t>GWF-GWT </a:t>
-              </a:r>
-            </a:p>
-            <a:p>
-              <a:pPr algn="ctr" defTabSz="457182"/>
-              <a:r>
-                <a:rPr lang="en-US" sz="1000" b="1" dirty="0">
-                  <a:solidFill>
-                    <a:prstClr val="black"/>
-                  </a:solidFill>
-                  <a:latin typeface="Arial"/>
-                  <a:cs typeface="Arial"/>
-                </a:rPr>
-                <a:t>Exchange 1</a:t>
-              </a:r>
-            </a:p>
-          </p:txBody>
-        </p:sp>
-        <p:sp>
-          <p:nvSpPr>
-            <p:cNvPr id="60" name="Rounded Rectangle 59">
-              <a:extLst>
-                <a:ext uri="{FF2B5EF4-FFF2-40B4-BE49-F238E27FC236}">
-                  <a16:creationId xmlns:a16="http://schemas.microsoft.com/office/drawing/2014/main" id="{1466784C-3996-3077-85CD-739516268036}"/>
-                </a:ext>
-              </a:extLst>
-            </p:cNvPr>
-            <p:cNvSpPr/>
-            <p:nvPr/>
-          </p:nvSpPr>
-          <p:spPr>
-            <a:xfrm>
-              <a:off x="8052060" y="5101629"/>
-              <a:ext cx="1537474" cy="351600"/>
-            </a:xfrm>
-            <a:prstGeom prst="roundRect">
-              <a:avLst/>
-            </a:prstGeom>
-            <a:solidFill>
-              <a:srgbClr val="FF85FF"/>
-            </a:solidFill>
-          </p:spPr>
-          <p:style>
-            <a:lnRef idx="2">
-              <a:schemeClr val="dk1"/>
-            </a:lnRef>
-            <a:fillRef idx="1">
-              <a:schemeClr val="lt1"/>
-            </a:fillRef>
-            <a:effectRef idx="0">
-              <a:schemeClr val="dk1"/>
-            </a:effectRef>
-            <a:fontRef idx="minor">
-              <a:schemeClr val="dk1"/>
-            </a:fontRef>
-          </p:style>
-          <p:txBody>
-            <a:bodyPr rtlCol="0" anchor="ctr"/>
-            <a:lstStyle/>
-            <a:p>
-              <a:pPr algn="ctr" defTabSz="457182"/>
-              <a:r>
-                <a:rPr lang="en-US" sz="1000" b="1" dirty="0">
-                  <a:solidFill>
-                    <a:prstClr val="black"/>
-                  </a:solidFill>
-                  <a:latin typeface="Arial"/>
-                  <a:cs typeface="Arial"/>
-                </a:rPr>
-                <a:t>GWF-GWT  </a:t>
-              </a:r>
-            </a:p>
-            <a:p>
-              <a:pPr algn="ctr" defTabSz="457182"/>
-              <a:r>
-                <a:rPr lang="en-US" sz="1000" b="1" dirty="0">
-                  <a:solidFill>
-                    <a:prstClr val="black"/>
-                  </a:solidFill>
-                  <a:latin typeface="Arial"/>
-                  <a:cs typeface="Arial"/>
-                </a:rPr>
-                <a:t>Exchange 2</a:t>
-              </a:r>
-            </a:p>
-          </p:txBody>
-        </p:sp>
-        <p:cxnSp>
-          <p:nvCxnSpPr>
-            <p:cNvPr id="61" name="Elbow Connector 60">
-              <a:extLst>
-                <a:ext uri="{FF2B5EF4-FFF2-40B4-BE49-F238E27FC236}">
-                  <a16:creationId xmlns:a16="http://schemas.microsoft.com/office/drawing/2014/main" id="{7CA073F6-9A39-6602-35D6-B536C19104CB}"/>
-                </a:ext>
-              </a:extLst>
-            </p:cNvPr>
-            <p:cNvCxnSpPr>
-              <a:cxnSpLocks/>
-              <a:stCxn id="28" idx="2"/>
-              <a:endCxn id="59" idx="1"/>
-            </p:cNvCxnSpPr>
-            <p:nvPr/>
-          </p:nvCxnSpPr>
-          <p:spPr>
-            <a:xfrm rot="16200000" flipH="1">
-              <a:off x="5887021" y="2613490"/>
-              <a:ext cx="4067651" cy="274120"/>
-            </a:xfrm>
-            <a:prstGeom prst="bentConnector2">
-              <a:avLst/>
-            </a:prstGeom>
-            <a:ln w="31750">
-              <a:solidFill>
-                <a:schemeClr val="tx1"/>
-              </a:solidFill>
-              <a:tailEnd type="triangle"/>
-            </a:ln>
-          </p:spPr>
-          <p:style>
-            <a:lnRef idx="2">
-              <a:schemeClr val="accent1"/>
-            </a:lnRef>
-            <a:fillRef idx="0">
-              <a:schemeClr val="accent1"/>
-            </a:fillRef>
-            <a:effectRef idx="1">
-              <a:schemeClr val="accent1"/>
-            </a:effectRef>
-            <a:fontRef idx="minor">
-              <a:schemeClr val="tx1"/>
-            </a:fontRef>
-          </p:style>
-        </p:cxnSp>
-        <p:cxnSp>
-          <p:nvCxnSpPr>
-            <p:cNvPr id="62" name="Elbow Connector 61">
-              <a:extLst>
-                <a:ext uri="{FF2B5EF4-FFF2-40B4-BE49-F238E27FC236}">
-                  <a16:creationId xmlns:a16="http://schemas.microsoft.com/office/drawing/2014/main" id="{87FCD514-1D4C-D877-142B-6B35177658D5}"/>
-                </a:ext>
-              </a:extLst>
-            </p:cNvPr>
-            <p:cNvCxnSpPr>
-              <a:cxnSpLocks/>
-              <a:stCxn id="28" idx="2"/>
-              <a:endCxn id="60" idx="1"/>
-            </p:cNvCxnSpPr>
-            <p:nvPr/>
-          </p:nvCxnSpPr>
-          <p:spPr>
-            <a:xfrm rot="16200000" flipH="1">
-              <a:off x="5637571" y="2862940"/>
-              <a:ext cx="4560704" cy="268274"/>
-            </a:xfrm>
-            <a:prstGeom prst="bentConnector2">
-              <a:avLst/>
-            </a:prstGeom>
-            <a:ln w="31750">
-              <a:solidFill>
-                <a:schemeClr val="tx1"/>
-              </a:solidFill>
-              <a:tailEnd type="triangle"/>
-            </a:ln>
-          </p:spPr>
-          <p:style>
-            <a:lnRef idx="2">
-              <a:schemeClr val="accent1"/>
-            </a:lnRef>
-            <a:fillRef idx="0">
-              <a:schemeClr val="accent1"/>
-            </a:fillRef>
-            <a:effectRef idx="1">
-              <a:schemeClr val="accent1"/>
-            </a:effectRef>
-            <a:fontRef idx="minor">
-              <a:schemeClr val="tx1"/>
-            </a:fontRef>
-          </p:style>
-        </p:cxnSp>
-        <p:cxnSp>
-          <p:nvCxnSpPr>
-            <p:cNvPr id="105" name="Straight Connector 104">
-              <a:extLst>
-                <a:ext uri="{FF2B5EF4-FFF2-40B4-BE49-F238E27FC236}">
-                  <a16:creationId xmlns:a16="http://schemas.microsoft.com/office/drawing/2014/main" id="{BBE8A71B-4DF7-4E24-A71A-F2E4B0716742}"/>
-                </a:ext>
-              </a:extLst>
-            </p:cNvPr>
-            <p:cNvCxnSpPr>
-              <a:cxnSpLocks/>
-            </p:cNvCxnSpPr>
-            <p:nvPr/>
-          </p:nvCxnSpPr>
-          <p:spPr>
-            <a:xfrm>
-              <a:off x="9589533" y="4840362"/>
-              <a:ext cx="1620016" cy="0"/>
-            </a:xfrm>
-            <a:prstGeom prst="line">
-              <a:avLst/>
-            </a:prstGeom>
-            <a:ln w="31750">
-              <a:solidFill>
-                <a:srgbClr val="FF85FF"/>
-              </a:solidFill>
-              <a:tailEnd type="none"/>
-            </a:ln>
-          </p:spPr>
-          <p:style>
-            <a:lnRef idx="2">
-              <a:schemeClr val="accent1"/>
-            </a:lnRef>
-            <a:fillRef idx="0">
-              <a:schemeClr val="accent1"/>
-            </a:fillRef>
-            <a:effectRef idx="1">
-              <a:schemeClr val="accent1"/>
-            </a:effectRef>
-            <a:fontRef idx="minor">
-              <a:schemeClr val="tx1"/>
-            </a:fontRef>
-          </p:style>
-        </p:cxnSp>
-        <p:cxnSp>
-          <p:nvCxnSpPr>
-            <p:cNvPr id="107" name="Straight Connector 106">
-              <a:extLst>
-                <a:ext uri="{FF2B5EF4-FFF2-40B4-BE49-F238E27FC236}">
-                  <a16:creationId xmlns:a16="http://schemas.microsoft.com/office/drawing/2014/main" id="{B1FCB635-6341-71CE-E316-705A26876439}"/>
-                </a:ext>
-              </a:extLst>
-            </p:cNvPr>
-            <p:cNvCxnSpPr>
-              <a:cxnSpLocks/>
-            </p:cNvCxnSpPr>
-            <p:nvPr/>
-          </p:nvCxnSpPr>
-          <p:spPr>
-            <a:xfrm flipH="1" flipV="1">
-              <a:off x="11196735" y="2043404"/>
-              <a:ext cx="12814" cy="2796958"/>
-            </a:xfrm>
-            <a:prstGeom prst="line">
-              <a:avLst/>
-            </a:prstGeom>
-            <a:ln w="31750">
-              <a:solidFill>
-                <a:srgbClr val="FF85FF"/>
-              </a:solidFill>
-              <a:tailEnd type="none"/>
-            </a:ln>
-          </p:spPr>
-          <p:style>
-            <a:lnRef idx="2">
-              <a:schemeClr val="accent1"/>
-            </a:lnRef>
-            <a:fillRef idx="0">
-              <a:schemeClr val="accent1"/>
-            </a:fillRef>
-            <a:effectRef idx="1">
-              <a:schemeClr val="accent1"/>
-            </a:effectRef>
-            <a:fontRef idx="minor">
-              <a:schemeClr val="tx1"/>
-            </a:fontRef>
-          </p:style>
-        </p:cxnSp>
-        <p:cxnSp>
-          <p:nvCxnSpPr>
-            <p:cNvPr id="117" name="Straight Connector 116">
-              <a:extLst>
-                <a:ext uri="{FF2B5EF4-FFF2-40B4-BE49-F238E27FC236}">
-                  <a16:creationId xmlns:a16="http://schemas.microsoft.com/office/drawing/2014/main" id="{4393D37D-E92D-EEF8-E0B7-1F13DB8456E7}"/>
-                </a:ext>
-              </a:extLst>
-            </p:cNvPr>
-            <p:cNvCxnSpPr>
-              <a:cxnSpLocks/>
-            </p:cNvCxnSpPr>
-            <p:nvPr/>
-          </p:nvCxnSpPr>
-          <p:spPr>
-            <a:xfrm>
-              <a:off x="10463185" y="2043404"/>
-              <a:ext cx="746364" cy="0"/>
-            </a:xfrm>
-            <a:prstGeom prst="line">
-              <a:avLst/>
-            </a:prstGeom>
-            <a:ln w="31750">
-              <a:solidFill>
-                <a:srgbClr val="FF85FF"/>
-              </a:solidFill>
-              <a:tailEnd type="none"/>
-            </a:ln>
-          </p:spPr>
-          <p:style>
-            <a:lnRef idx="2">
-              <a:schemeClr val="accent1"/>
-            </a:lnRef>
-            <a:fillRef idx="0">
-              <a:schemeClr val="accent1"/>
-            </a:fillRef>
-            <a:effectRef idx="1">
-              <a:schemeClr val="accent1"/>
-            </a:effectRef>
-            <a:fontRef idx="minor">
-              <a:schemeClr val="tx1"/>
-            </a:fontRef>
-          </p:style>
-        </p:cxnSp>
-        <p:cxnSp>
-          <p:nvCxnSpPr>
-            <p:cNvPr id="121" name="Straight Connector 120">
-              <a:extLst>
-                <a:ext uri="{FF2B5EF4-FFF2-40B4-BE49-F238E27FC236}">
-                  <a16:creationId xmlns:a16="http://schemas.microsoft.com/office/drawing/2014/main" id="{ED900009-A5A1-6570-9E10-A823EF03116C}"/>
-                </a:ext>
-              </a:extLst>
-            </p:cNvPr>
-            <p:cNvCxnSpPr>
-              <a:cxnSpLocks/>
-            </p:cNvCxnSpPr>
-            <p:nvPr/>
-          </p:nvCxnSpPr>
-          <p:spPr>
-            <a:xfrm>
-              <a:off x="9555181" y="5328219"/>
-              <a:ext cx="1778635" cy="0"/>
-            </a:xfrm>
-            <a:prstGeom prst="line">
-              <a:avLst/>
-            </a:prstGeom>
-            <a:ln w="31750">
-              <a:solidFill>
-                <a:srgbClr val="FF85FF"/>
-              </a:solidFill>
-              <a:tailEnd type="none"/>
-            </a:ln>
-          </p:spPr>
-          <p:style>
-            <a:lnRef idx="2">
-              <a:schemeClr val="accent1"/>
-            </a:lnRef>
-            <a:fillRef idx="0">
-              <a:schemeClr val="accent1"/>
-            </a:fillRef>
-            <a:effectRef idx="1">
-              <a:schemeClr val="accent1"/>
-            </a:effectRef>
-            <a:fontRef idx="minor">
-              <a:schemeClr val="tx1"/>
-            </a:fontRef>
-          </p:style>
-        </p:cxnSp>
-        <p:cxnSp>
-          <p:nvCxnSpPr>
-            <p:cNvPr id="122" name="Straight Connector 121">
-              <a:extLst>
-                <a:ext uri="{FF2B5EF4-FFF2-40B4-BE49-F238E27FC236}">
-                  <a16:creationId xmlns:a16="http://schemas.microsoft.com/office/drawing/2014/main" id="{781A87DF-B373-0581-DCBE-CB188A9A88C8}"/>
-                </a:ext>
-              </a:extLst>
-            </p:cNvPr>
-            <p:cNvCxnSpPr>
-              <a:cxnSpLocks/>
-            </p:cNvCxnSpPr>
-            <p:nvPr/>
-          </p:nvCxnSpPr>
-          <p:spPr>
-            <a:xfrm flipH="1" flipV="1">
-              <a:off x="11327410" y="1903445"/>
-              <a:ext cx="6406" cy="3424774"/>
-            </a:xfrm>
-            <a:prstGeom prst="line">
-              <a:avLst/>
-            </a:prstGeom>
-            <a:ln w="31750">
-              <a:solidFill>
-                <a:srgbClr val="FF85FF"/>
-              </a:solidFill>
-              <a:tailEnd type="none"/>
-            </a:ln>
-          </p:spPr>
-          <p:style>
-            <a:lnRef idx="2">
-              <a:schemeClr val="accent1"/>
-            </a:lnRef>
-            <a:fillRef idx="0">
-              <a:schemeClr val="accent1"/>
-            </a:fillRef>
-            <a:effectRef idx="1">
-              <a:schemeClr val="accent1"/>
-            </a:effectRef>
-            <a:fontRef idx="minor">
-              <a:schemeClr val="tx1"/>
-            </a:fontRef>
-          </p:style>
-        </p:cxnSp>
-        <p:cxnSp>
-          <p:nvCxnSpPr>
-            <p:cNvPr id="123" name="Straight Connector 122">
-              <a:extLst>
-                <a:ext uri="{FF2B5EF4-FFF2-40B4-BE49-F238E27FC236}">
-                  <a16:creationId xmlns:a16="http://schemas.microsoft.com/office/drawing/2014/main" id="{109EDFF6-31DF-1492-9A83-12827A9F28C7}"/>
-                </a:ext>
-              </a:extLst>
-            </p:cNvPr>
-            <p:cNvCxnSpPr>
-              <a:cxnSpLocks/>
-            </p:cNvCxnSpPr>
-            <p:nvPr/>
-          </p:nvCxnSpPr>
-          <p:spPr>
-            <a:xfrm>
-              <a:off x="10463185" y="1903445"/>
-              <a:ext cx="864225" cy="0"/>
-            </a:xfrm>
-            <a:prstGeom prst="line">
-              <a:avLst/>
-            </a:prstGeom>
-            <a:ln w="31750">
-              <a:solidFill>
-                <a:srgbClr val="FF85FF"/>
-              </a:solidFill>
-              <a:tailEnd type="none"/>
-            </a:ln>
-          </p:spPr>
-          <p:style>
-            <a:lnRef idx="2">
-              <a:schemeClr val="accent1"/>
-            </a:lnRef>
-            <a:fillRef idx="0">
-              <a:schemeClr val="accent1"/>
-            </a:fillRef>
-            <a:effectRef idx="1">
-              <a:schemeClr val="accent1"/>
-            </a:effectRef>
-            <a:fontRef idx="minor">
-              <a:schemeClr val="tx1"/>
-            </a:fontRef>
-          </p:style>
-        </p:cxnSp>
       </p:grpSp>
       <p:sp>
         <p:nvSpPr>
-          <p:cNvPr id="133" name="Content Placeholder 2">
-            <a:extLst>
-              <a:ext uri="{FF2B5EF4-FFF2-40B4-BE49-F238E27FC236}">
-                <a16:creationId xmlns:a16="http://schemas.microsoft.com/office/drawing/2014/main" id="{9D6BF0ED-FDA8-61E8-220A-3B6D1F144DE4}"/>
-              </a:ext>
-            </a:extLst>
-          </p:cNvPr>
-          <p:cNvSpPr txBox="1">
-            <a:spLocks/>
-          </p:cNvSpPr>
+          <p:cNvPr id="14" name="TextBox 13">
+            <a:extLst>
+              <a:ext uri="{FF2B5EF4-FFF2-40B4-BE49-F238E27FC236}">
+                <a16:creationId xmlns:a16="http://schemas.microsoft.com/office/drawing/2014/main" id="{C1085C9F-A6BB-5C9D-0E1E-70341FBC3433}"/>
+              </a:ext>
+            </a:extLst>
+          </p:cNvPr>
+          <p:cNvSpPr txBox="1"/>
           <p:nvPr/>
+        </p:nvSpPr>
+        <p:spPr>
+          <a:xfrm>
+            <a:off x="342867" y="6389370"/>
+            <a:ext cx="5527282" cy="369332"/>
+          </a:xfrm>
+          <a:prstGeom prst="rect">
+            <a:avLst/>
+          </a:prstGeom>
+          <a:noFill/>
+        </p:spPr>
+        <p:txBody>
+          <a:bodyPr wrap="none" rtlCol="0">
+            <a:spAutoFit/>
+          </a:bodyPr>
+          <a:lstStyle/>
+          <a:p>
+            <a:r>
+              <a:rPr lang="en-US" dirty="0">
+                <a:solidFill>
+                  <a:srgbClr val="FF0000"/>
+                </a:solidFill>
+              </a:rPr>
+              <a:t>Limitation: Buoyancy package cannot be used with XT3D</a:t>
+            </a:r>
+          </a:p>
+        </p:txBody>
+      </p:sp>
+    </p:spTree>
+    <p:extLst>
+      <p:ext uri="{BB962C8B-B14F-4D97-AF65-F5344CB8AC3E}">
+        <p14:creationId xmlns:p14="http://schemas.microsoft.com/office/powerpoint/2010/main" val="370901752"/>
+      </p:ext>
+    </p:extLst>
+  </p:cSld>
+  <p:clrMapOvr>
+    <a:masterClrMapping/>
+  </p:clrMapOvr>
+  <p:timing>
+    <p:tnLst>
+      <p:par>
+        <p:cTn id="1" dur="indefinite" restart="never" nodeType="tmRoot">
+          <p:childTnLst>
+            <p:seq concurrent="1" nextAc="seek">
+              <p:cTn id="2" dur="indefinite" nodeType="mainSeq">
+                <p:childTnLst>
+                  <p:par>
+                    <p:cTn id="3" fill="hold">
+                      <p:stCondLst>
+                        <p:cond delay="indefinite"/>
+                      </p:stCondLst>
+                      <p:childTnLst>
+                        <p:par>
+                          <p:cTn id="4" fill="hold">
+                            <p:stCondLst>
+                              <p:cond delay="0"/>
+                            </p:stCondLst>
+                            <p:childTnLst>
+                              <p:par>
+                                <p:cTn id="5" presetID="1" presetClass="entr" presetSubtype="0" fill="hold" nodeType="clickEffect">
+                                  <p:stCondLst>
+                                    <p:cond delay="0"/>
+                                  </p:stCondLst>
+                                  <p:childTnLst>
+                                    <p:set>
+                                      <p:cBhvr>
+                                        <p:cTn id="6" dur="1" fill="hold">
+                                          <p:stCondLst>
+                                            <p:cond delay="0"/>
+                                          </p:stCondLst>
+                                        </p:cTn>
+                                        <p:tgtEl>
+                                          <p:spTgt spid="11"/>
+                                        </p:tgtEl>
+                                        <p:attrNameLst>
+                                          <p:attrName>style.visibility</p:attrName>
+                                        </p:attrNameLst>
+                                      </p:cBhvr>
+                                      <p:to>
+                                        <p:strVal val="visible"/>
+                                      </p:to>
+                                    </p:set>
+                                  </p:childTnLst>
+                                </p:cTn>
+                              </p:par>
+                            </p:childTnLst>
+                          </p:cTn>
+                        </p:par>
+                      </p:childTnLst>
+                    </p:cTn>
+                  </p:par>
+                  <p:par>
+                    <p:cTn id="7" fill="hold">
+                      <p:stCondLst>
+                        <p:cond delay="indefinite"/>
+                      </p:stCondLst>
+                      <p:childTnLst>
+                        <p:par>
+                          <p:cTn id="8" fill="hold">
+                            <p:stCondLst>
+                              <p:cond delay="0"/>
+                            </p:stCondLst>
+                            <p:childTnLst>
+                              <p:par>
+                                <p:cTn id="9" presetID="1" presetClass="entr" presetSubtype="0" fill="hold" nodeType="clickEffect">
+                                  <p:stCondLst>
+                                    <p:cond delay="0"/>
+                                  </p:stCondLst>
+                                  <p:childTnLst>
+                                    <p:set>
+                                      <p:cBhvr>
+                                        <p:cTn id="10" dur="1" fill="hold">
+                                          <p:stCondLst>
+                                            <p:cond delay="0"/>
+                                          </p:stCondLst>
+                                        </p:cTn>
+                                        <p:tgtEl>
+                                          <p:spTgt spid="12"/>
+                                        </p:tgtEl>
+                                        <p:attrNameLst>
+                                          <p:attrName>style.visibility</p:attrName>
+                                        </p:attrNameLst>
+                                      </p:cBhvr>
+                                      <p:to>
+                                        <p:strVal val="visible"/>
+                                      </p:to>
+                                    </p:set>
+                                  </p:childTnLst>
+                                </p:cTn>
+                              </p:par>
+                            </p:childTnLst>
+                          </p:cTn>
+                        </p:par>
+                      </p:childTnLst>
+                    </p:cTn>
+                  </p:par>
+                  <p:par>
+                    <p:cTn id="11" fill="hold">
+                      <p:stCondLst>
+                        <p:cond delay="indefinite"/>
+                      </p:stCondLst>
+                      <p:childTnLst>
+                        <p:par>
+                          <p:cTn id="12" fill="hold">
+                            <p:stCondLst>
+                              <p:cond delay="0"/>
+                            </p:stCondLst>
+                            <p:childTnLst>
+                              <p:par>
+                                <p:cTn id="13" presetID="1" presetClass="entr" presetSubtype="0" fill="hold" nodeType="clickEffect">
+                                  <p:stCondLst>
+                                    <p:cond delay="0"/>
+                                  </p:stCondLst>
+                                  <p:childTnLst>
+                                    <p:set>
+                                      <p:cBhvr>
+                                        <p:cTn id="14" dur="1" fill="hold">
+                                          <p:stCondLst>
+                                            <p:cond delay="0"/>
+                                          </p:stCondLst>
+                                        </p:cTn>
+                                        <p:tgtEl>
+                                          <p:spTgt spid="13"/>
+                                        </p:tgtEl>
+                                        <p:attrNameLst>
+                                          <p:attrName>style.visibility</p:attrName>
+                                        </p:attrNameLst>
+                                      </p:cBhvr>
+                                      <p:to>
+                                        <p:strVal val="visible"/>
+                                      </p:to>
+                                    </p:set>
+                                  </p:childTnLst>
+                                </p:cTn>
+                              </p:par>
+                            </p:childTnLst>
+                          </p:cTn>
+                        </p:par>
+                      </p:childTnLst>
+                    </p:cTn>
+                  </p:par>
+                  <p:par>
+                    <p:cTn id="15" fill="hold">
+                      <p:stCondLst>
+                        <p:cond delay="indefinite"/>
+                      </p:stCondLst>
+                      <p:childTnLst>
+                        <p:par>
+                          <p:cTn id="16" fill="hold">
+                            <p:stCondLst>
+                              <p:cond delay="0"/>
+                            </p:stCondLst>
+                            <p:childTnLst>
+                              <p:par>
+                                <p:cTn id="17" presetID="1" presetClass="entr" presetSubtype="0" fill="hold" grpId="0" nodeType="clickEffect">
+                                  <p:stCondLst>
+                                    <p:cond delay="0"/>
+                                  </p:stCondLst>
+                                  <p:childTnLst>
+                                    <p:set>
+                                      <p:cBhvr>
+                                        <p:cTn id="18" dur="1" fill="hold">
+                                          <p:stCondLst>
+                                            <p:cond delay="0"/>
+                                          </p:stCondLst>
+                                        </p:cTn>
+                                        <p:tgtEl>
+                                          <p:spTgt spid="14"/>
+                                        </p:tgtEl>
+                                        <p:attrNameLst>
+                                          <p:attrName>style.visibility</p:attrName>
+                                        </p:attrNameLst>
+                                      </p:cBhvr>
+                                      <p:to>
+                                        <p:strVal val="visible"/>
+                                      </p:to>
+                                    </p:set>
+                                  </p:childTnLst>
+                                </p:cTn>
+                              </p:par>
+                            </p:childTnLst>
+                          </p:cTn>
+                        </p:par>
+                      </p:childTnLst>
+                    </p:cTn>
+                  </p:par>
+                </p:childTnLst>
+              </p:cTn>
+              <p:prevCondLst>
+                <p:cond evt="onPrev" delay="0">
+                  <p:tgtEl>
+                    <p:sldTgt/>
+                  </p:tgtEl>
+                </p:cond>
+              </p:prevCondLst>
+              <p:nextCondLst>
+                <p:cond evt="onNext" delay="0">
+                  <p:tgtEl>
+                    <p:sldTgt/>
+                  </p:tgtEl>
+                </p:cond>
+              </p:nextCondLst>
+            </p:seq>
+          </p:childTnLst>
+        </p:cTn>
+      </p:par>
+    </p:tnLst>
+    <p:bldLst>
+      <p:bldP spid="14" grpId="0"/>
+    </p:bldLst>
+  </p:timing>
+</p:sld>
+</file>
+
+<file path=ppt/slides/slide5.xml><?xml version="1.0" encoding="utf-8"?>
+<p:sld xmlns:a="http://schemas.openxmlformats.org/drawingml/2006/main" xmlns:r="http://schemas.openxmlformats.org/officeDocument/2006/relationships" xmlns:p="http://schemas.openxmlformats.org/presentationml/2006/main">
+  <p:cSld>
+    <p:spTree>
+      <p:nvGrpSpPr>
+        <p:cNvPr id="1" name=""/>
+        <p:cNvGrpSpPr/>
+        <p:nvPr/>
+      </p:nvGrpSpPr>
+      <p:grpSpPr>
+        <a:xfrm>
+          <a:off x="0" y="0"/>
+          <a:ext cx="0" cy="0"/>
+          <a:chOff x="0" y="0"/>
+          <a:chExt cx="0" cy="0"/>
+        </a:xfrm>
+      </p:grpSpPr>
+      <p:pic>
+        <p:nvPicPr>
+          <p:cNvPr id="3" name="anim">
+            <a:hlinkClick r:id="" action="ppaction://media"/>
+            <a:extLst>
+              <a:ext uri="{FF2B5EF4-FFF2-40B4-BE49-F238E27FC236}">
+                <a16:creationId xmlns:a16="http://schemas.microsoft.com/office/drawing/2014/main" id="{B321BBFE-9215-8144-6E3F-0E5FF2AF1CD0}"/>
+              </a:ext>
+            </a:extLst>
+          </p:cNvPr>
+          <p:cNvPicPr>
+            <a:picLocks noChangeAspect="1"/>
+          </p:cNvPicPr>
+          <p:nvPr>
+            <a:videoFile r:link="rId2"/>
+            <p:extLst>
+              <p:ext uri="{DAA4B4D4-6D71-4841-9C94-3DE7FCFB9230}">
+                <p14:media xmlns:p14="http://schemas.microsoft.com/office/powerpoint/2010/main" r:embed="rId1"/>
+              </p:ext>
+            </p:extLst>
+          </p:nvPr>
+        </p:nvPicPr>
+        <p:blipFill rotWithShape="1">
+          <a:blip r:embed="rId5"/>
+          <a:srcRect l="22944" r="10786"/>
+          <a:stretch/>
+        </p:blipFill>
+        <p:spPr>
+          <a:xfrm>
+            <a:off x="6213512" y="1167117"/>
+            <a:ext cx="6070295" cy="5152516"/>
+          </a:xfrm>
+          <a:prstGeom prst="rect">
+            <a:avLst/>
+          </a:prstGeom>
+        </p:spPr>
+      </p:pic>
+      <p:sp>
+        <p:nvSpPr>
+          <p:cNvPr id="2" name="Title 1">
+            <a:extLst>
+              <a:ext uri="{FF2B5EF4-FFF2-40B4-BE49-F238E27FC236}">
+                <a16:creationId xmlns:a16="http://schemas.microsoft.com/office/drawing/2014/main" id="{10E6F2A4-5566-37D6-214F-7B289CEBA0C6}"/>
+              </a:ext>
+            </a:extLst>
+          </p:cNvPr>
+          <p:cNvSpPr>
+            <a:spLocks noGrp="1"/>
+          </p:cNvSpPr>
+          <p:nvPr>
+            <p:ph type="title"/>
+          </p:nvPr>
+        </p:nvSpPr>
+        <p:spPr/>
+        <p:txBody>
+          <a:bodyPr/>
+          <a:lstStyle/>
+          <a:p>
+            <a:r>
+              <a:rPr lang="en-US"/>
+              <a:t>3D Salt Lake example</a:t>
+            </a:r>
+            <a:endParaRPr lang="en-US" dirty="0"/>
+          </a:p>
+        </p:txBody>
+      </p:sp>
+      <p:sp>
+        <p:nvSpPr>
+          <p:cNvPr id="4" name="Content Placeholder 3">
+            <a:extLst>
+              <a:ext uri="{FF2B5EF4-FFF2-40B4-BE49-F238E27FC236}">
+                <a16:creationId xmlns:a16="http://schemas.microsoft.com/office/drawing/2014/main" id="{E2081B4F-DA2B-7372-CF87-2412895DB207}"/>
+              </a:ext>
+            </a:extLst>
+          </p:cNvPr>
+          <p:cNvSpPr>
+            <a:spLocks noGrp="1"/>
+          </p:cNvSpPr>
+          <p:nvPr>
+            <p:ph idx="1"/>
+          </p:nvPr>
         </p:nvSpPr>
         <p:spPr>
           <a:xfrm>
             <a:off x="838200" y="1825625"/>
-            <a:ext cx="10515600" cy="4351338"/>
+            <a:ext cx="4857520" cy="4351338"/>
+          </a:xfrm>
+        </p:spPr>
+        <p:txBody>
+          <a:bodyPr/>
+          <a:lstStyle/>
+          <a:p>
+            <a:r>
+              <a:rPr lang="en-US" dirty="0"/>
+              <a:t>Coupled variable-density flow and transport simulation </a:t>
+            </a:r>
+          </a:p>
+          <a:p>
+            <a:r>
+              <a:rPr lang="en-US" dirty="0"/>
+              <a:t>Solved in parallel on a laptop using 8 cores</a:t>
+            </a:r>
+          </a:p>
+        </p:txBody>
+      </p:sp>
+    </p:spTree>
+    <p:extLst>
+      <p:ext uri="{BB962C8B-B14F-4D97-AF65-F5344CB8AC3E}">
+        <p14:creationId xmlns:p14="http://schemas.microsoft.com/office/powerpoint/2010/main" val="3306013129"/>
+      </p:ext>
+    </p:extLst>
+  </p:cSld>
+  <p:clrMapOvr>
+    <a:masterClrMapping/>
+  </p:clrMapOvr>
+  <p:timing>
+    <p:tnLst>
+      <p:par>
+        <p:cTn id="1" dur="indefinite" restart="never" nodeType="tmRoot">
+          <p:childTnLst>
+            <p:seq concurrent="1" nextAc="seek">
+              <p:cTn id="2" dur="indefinite" nodeType="mainSeq">
+                <p:childTnLst>
+                  <p:par>
+                    <p:cTn id="3" fill="hold">
+                      <p:stCondLst>
+                        <p:cond delay="indefinite"/>
+                        <p:cond evt="onBegin" delay="0">
+                          <p:tn val="2"/>
+                        </p:cond>
+                      </p:stCondLst>
+                      <p:childTnLst>
+                        <p:par>
+                          <p:cTn id="4" fill="hold">
+                            <p:stCondLst>
+                              <p:cond delay="0"/>
+                            </p:stCondLst>
+                            <p:childTnLst>
+                              <p:par>
+                                <p:cTn id="5" presetID="1" presetClass="mediacall" presetSubtype="0" fill="hold" nodeType="withEffect">
+                                  <p:stCondLst>
+                                    <p:cond delay="0"/>
+                                  </p:stCondLst>
+                                  <p:childTnLst>
+                                    <p:cmd type="call" cmd="playFrom(0.0)">
+                                      <p:cBhvr>
+                                        <p:cTn id="6" dur="16000" fill="hold"/>
+                                        <p:tgtEl>
+                                          <p:spTgt spid="3"/>
+                                        </p:tgtEl>
+                                      </p:cBhvr>
+                                    </p:cmd>
+                                  </p:childTnLst>
+                                </p:cTn>
+                              </p:par>
+                            </p:childTnLst>
+                          </p:cTn>
+                        </p:par>
+                      </p:childTnLst>
+                    </p:cTn>
+                  </p:par>
+                </p:childTnLst>
+              </p:cTn>
+              <p:prevCondLst>
+                <p:cond evt="onPrev" delay="0">
+                  <p:tgtEl>
+                    <p:sldTgt/>
+                  </p:tgtEl>
+                </p:cond>
+              </p:prevCondLst>
+              <p:nextCondLst>
+                <p:cond evt="onNext" delay="0">
+                  <p:tgtEl>
+                    <p:sldTgt/>
+                  </p:tgtEl>
+                </p:cond>
+              </p:nextCondLst>
+            </p:seq>
+            <p:video>
+              <p:cMediaNode vol="80000">
+                <p:cTn id="7" repeatCount="indefinite" fill="hold" display="0">
+                  <p:stCondLst>
+                    <p:cond delay="indefinite"/>
+                  </p:stCondLst>
+                </p:cTn>
+                <p:tgtEl>
+                  <p:spTgt spid="3"/>
+                </p:tgtEl>
+              </p:cMediaNode>
+            </p:video>
+            <p:seq concurrent="1" nextAc="seek">
+              <p:cTn id="8" restart="whenNotActive" fill="hold" evtFilter="cancelBubble" nodeType="interactiveSeq">
+                <p:stCondLst>
+                  <p:cond evt="onClick" delay="0">
+                    <p:tgtEl>
+                      <p:spTgt spid="3"/>
+                    </p:tgtEl>
+                  </p:cond>
+                </p:stCondLst>
+                <p:endSync evt="end" delay="0">
+                  <p:rtn val="all"/>
+                </p:endSync>
+                <p:childTnLst>
+                  <p:par>
+                    <p:cTn id="9" fill="hold">
+                      <p:stCondLst>
+                        <p:cond delay="0"/>
+                      </p:stCondLst>
+                      <p:childTnLst>
+                        <p:par>
+                          <p:cTn id="10" fill="hold">
+                            <p:stCondLst>
+                              <p:cond delay="0"/>
+                            </p:stCondLst>
+                            <p:childTnLst>
+                              <p:par>
+                                <p:cTn id="11" presetID="2" presetClass="mediacall" presetSubtype="0" fill="hold" nodeType="clickEffect">
+                                  <p:stCondLst>
+                                    <p:cond delay="0"/>
+                                  </p:stCondLst>
+                                  <p:childTnLst>
+                                    <p:cmd type="call" cmd="togglePause">
+                                      <p:cBhvr>
+                                        <p:cTn id="12" dur="1" fill="hold"/>
+                                        <p:tgtEl>
+                                          <p:spTgt spid="3"/>
+                                        </p:tgtEl>
+                                      </p:cBhvr>
+                                    </p:cmd>
+                                  </p:childTnLst>
+                                </p:cTn>
+                              </p:par>
+                            </p:childTnLst>
+                          </p:cTn>
+                        </p:par>
+                      </p:childTnLst>
+                    </p:cTn>
+                  </p:par>
+                </p:childTnLst>
+              </p:cTn>
+              <p:nextCondLst>
+                <p:cond evt="onClick" delay="0">
+                  <p:tgtEl>
+                    <p:spTgt spid="3"/>
+                  </p:tgtEl>
+                </p:cond>
+              </p:nextCondLst>
+            </p:seq>
+          </p:childTnLst>
+        </p:cTn>
+      </p:par>
+    </p:tnLst>
+  </p:timing>
+</p:sld>
+</file>
+
+<file path=ppt/slides/slide6.xml><?xml version="1.0" encoding="utf-8"?>
+<p:sld xmlns:a="http://schemas.openxmlformats.org/drawingml/2006/main" xmlns:r="http://schemas.openxmlformats.org/officeDocument/2006/relationships" xmlns:p="http://schemas.openxmlformats.org/presentationml/2006/main">
+  <p:cSld>
+    <p:spTree>
+      <p:nvGrpSpPr>
+        <p:cNvPr id="1" name=""/>
+        <p:cNvGrpSpPr/>
+        <p:nvPr/>
+      </p:nvGrpSpPr>
+      <p:grpSpPr>
+        <a:xfrm>
+          <a:off x="0" y="0"/>
+          <a:ext cx="0" cy="0"/>
+          <a:chOff x="0" y="0"/>
+          <a:chExt cx="0" cy="0"/>
+        </a:xfrm>
+      </p:grpSpPr>
+      <p:sp>
+        <p:nvSpPr>
+          <p:cNvPr id="135" name="Title 134">
+            <a:extLst>
+              <a:ext uri="{FF2B5EF4-FFF2-40B4-BE49-F238E27FC236}">
+                <a16:creationId xmlns:a16="http://schemas.microsoft.com/office/drawing/2014/main" id="{713FF344-DAF9-257D-7A40-0DE29F2F670C}"/>
+              </a:ext>
+            </a:extLst>
+          </p:cNvPr>
+          <p:cNvSpPr>
+            <a:spLocks noGrp="1"/>
+          </p:cNvSpPr>
+          <p:nvPr>
+            <p:ph type="title"/>
+          </p:nvPr>
+        </p:nvSpPr>
+        <p:spPr/>
+        <p:txBody>
+          <a:bodyPr/>
+          <a:lstStyle/>
+          <a:p>
+            <a:r>
+              <a:rPr lang="nl-NL"/>
+              <a:t>Today’s example: multi-model configuration</a:t>
+            </a:r>
+          </a:p>
+        </p:txBody>
+      </p:sp>
+      <p:sp>
+        <p:nvSpPr>
+          <p:cNvPr id="3" name="Content Placeholder 2">
+            <a:extLst>
+              <a:ext uri="{FF2B5EF4-FFF2-40B4-BE49-F238E27FC236}">
+                <a16:creationId xmlns:a16="http://schemas.microsoft.com/office/drawing/2014/main" id="{910AB305-34F5-432C-CBF6-DDEFFA88EE97}"/>
+              </a:ext>
+            </a:extLst>
+          </p:cNvPr>
+          <p:cNvSpPr txBox="1">
+            <a:spLocks/>
+          </p:cNvSpPr>
+          <p:nvPr/>
+        </p:nvSpPr>
+        <p:spPr>
+          <a:xfrm>
+            <a:off x="838200" y="1825625"/>
+            <a:ext cx="5011057" cy="4351338"/>
           </a:xfrm>
           <a:prstGeom prst="rect">
             <a:avLst/>
@@ -6285,132 +6706,52 @@
           <a:p>
             <a:r>
               <a:rPr lang="en-US"/>
-              <a:t>Blabla</a:t>
+              <a:t>Activate Buoyancy (BUY) Package in the GWF Model</a:t>
+            </a:r>
+          </a:p>
+          <a:p>
+            <a:r>
+              <a:rPr lang="en-US"/>
+              <a:t>Run GWF and transport models (GWT) together in the same simulation (requires GWF-GWT Exchanges)</a:t>
             </a:r>
             <a:endParaRPr lang="en-US" dirty="0"/>
           </a:p>
         </p:txBody>
       </p:sp>
-      <p:sp>
-        <p:nvSpPr>
-          <p:cNvPr id="135" name="Title 134">
-            <a:extLst>
-              <a:ext uri="{FF2B5EF4-FFF2-40B4-BE49-F238E27FC236}">
-                <a16:creationId xmlns:a16="http://schemas.microsoft.com/office/drawing/2014/main" id="{713FF344-DAF9-257D-7A40-0DE29F2F670C}"/>
-              </a:ext>
-            </a:extLst>
-          </p:cNvPr>
-          <p:cNvSpPr>
-            <a:spLocks noGrp="1"/>
-          </p:cNvSpPr>
-          <p:nvPr>
-            <p:ph type="title"/>
-          </p:nvPr>
-        </p:nvSpPr>
-        <p:spPr/>
-        <p:txBody>
-          <a:bodyPr/>
-          <a:lstStyle/>
-          <a:p>
-            <a:r>
-              <a:rPr lang="nl-NL"/>
-              <a:t>Multi-model configuration</a:t>
-            </a:r>
-          </a:p>
-        </p:txBody>
-      </p:sp>
+      <p:pic>
+        <p:nvPicPr>
+          <p:cNvPr id="4" name="Picture 3">
+            <a:extLst>
+              <a:ext uri="{FF2B5EF4-FFF2-40B4-BE49-F238E27FC236}">
+                <a16:creationId xmlns:a16="http://schemas.microsoft.com/office/drawing/2014/main" id="{7C040239-FC78-9B76-809E-94ED15D99513}"/>
+              </a:ext>
+            </a:extLst>
+          </p:cNvPr>
+          <p:cNvPicPr>
+            <a:picLocks noChangeAspect="1"/>
+          </p:cNvPicPr>
+          <p:nvPr/>
+        </p:nvPicPr>
+        <p:blipFill>
+          <a:blip r:embed="rId2"/>
+          <a:stretch>
+            <a:fillRect/>
+          </a:stretch>
+        </p:blipFill>
+        <p:spPr>
+          <a:xfrm>
+            <a:off x="6893615" y="1825625"/>
+            <a:ext cx="4006614" cy="3946253"/>
+          </a:xfrm>
+          <a:prstGeom prst="rect">
+            <a:avLst/>
+          </a:prstGeom>
+        </p:spPr>
+      </p:pic>
     </p:spTree>
     <p:extLst>
       <p:ext uri="{BB962C8B-B14F-4D97-AF65-F5344CB8AC3E}">
         <p14:creationId xmlns:p14="http://schemas.microsoft.com/office/powerpoint/2010/main" val="3428667621"/>
-      </p:ext>
-    </p:extLst>
-  </p:cSld>
-  <p:clrMapOvr>
-    <a:masterClrMapping/>
-  </p:clrMapOvr>
-</p:sld>
-</file>
-
-<file path=ppt/slides/slide4.xml><?xml version="1.0" encoding="utf-8"?>
-<p:sld xmlns:a="http://schemas.openxmlformats.org/drawingml/2006/main" xmlns:r="http://schemas.openxmlformats.org/officeDocument/2006/relationships" xmlns:p="http://schemas.openxmlformats.org/presentationml/2006/main">
-  <p:cSld>
-    <p:spTree>
-      <p:nvGrpSpPr>
-        <p:cNvPr id="1" name=""/>
-        <p:cNvGrpSpPr/>
-        <p:nvPr/>
-      </p:nvGrpSpPr>
-      <p:grpSpPr>
-        <a:xfrm>
-          <a:off x="0" y="0"/>
-          <a:ext cx="0" cy="0"/>
-          <a:chOff x="0" y="0"/>
-          <a:chExt cx="0" cy="0"/>
-        </a:xfrm>
-      </p:grpSpPr>
-      <p:sp>
-        <p:nvSpPr>
-          <p:cNvPr id="2" name="Title 1">
-            <a:extLst>
-              <a:ext uri="{FF2B5EF4-FFF2-40B4-BE49-F238E27FC236}">
-                <a16:creationId xmlns:a16="http://schemas.microsoft.com/office/drawing/2014/main" id="{C6262CAE-79D5-F173-F11C-71D37E6D57D4}"/>
-              </a:ext>
-            </a:extLst>
-          </p:cNvPr>
-          <p:cNvSpPr>
-            <a:spLocks noGrp="1"/>
-          </p:cNvSpPr>
-          <p:nvPr>
-            <p:ph type="title"/>
-          </p:nvPr>
-        </p:nvSpPr>
-        <p:spPr/>
-        <p:txBody>
-          <a:bodyPr/>
-          <a:lstStyle/>
-          <a:p>
-            <a:r>
-              <a:rPr lang="en-US"/>
-              <a:t>Buoyant Flow</a:t>
-            </a:r>
-            <a:endParaRPr lang="en-US" dirty="0"/>
-          </a:p>
-        </p:txBody>
-      </p:sp>
-      <p:sp>
-        <p:nvSpPr>
-          <p:cNvPr id="3" name="Content Placeholder 2">
-            <a:extLst>
-              <a:ext uri="{FF2B5EF4-FFF2-40B4-BE49-F238E27FC236}">
-                <a16:creationId xmlns:a16="http://schemas.microsoft.com/office/drawing/2014/main" id="{54E8EABB-98F9-6162-F217-C869B7602A79}"/>
-              </a:ext>
-            </a:extLst>
-          </p:cNvPr>
-          <p:cNvSpPr>
-            <a:spLocks noGrp="1"/>
-          </p:cNvSpPr>
-          <p:nvPr>
-            <p:ph idx="1"/>
-          </p:nvPr>
-        </p:nvSpPr>
-        <p:spPr/>
-        <p:txBody>
-          <a:bodyPr/>
-          <a:lstStyle/>
-          <a:p>
-            <a:r>
-              <a:rPr lang="en-US"/>
-              <a:t>Blabla</a:t>
-            </a:r>
-            <a:endParaRPr lang="en-US" dirty="0"/>
-          </a:p>
-        </p:txBody>
-      </p:sp>
-    </p:spTree>
-    <p:extLst>
-      <p:ext uri="{BB962C8B-B14F-4D97-AF65-F5344CB8AC3E}">
-        <p14:creationId xmlns:p14="http://schemas.microsoft.com/office/powerpoint/2010/main" val="2907352725"/>
       </p:ext>
     </p:extLst>
   </p:cSld>

</xml_diff>